<commit_message>
Project Section 2: Started 50%
</commit_message>
<xml_diff>
--- a/Visual Plan.pptx
+++ b/Visual Plan.pptx
@@ -141,7 +141,7 @@
           <p:cNvPr id="2" name="Title 1">
             <a:extLst>
               <a:ext uri="{FF2B5EF4-FFF2-40B4-BE49-F238E27FC236}">
-                <a16:creationId xmlns:a16="http://schemas.microsoft.com/office/drawing/2014/main" id="{43893EEA-2329-4BD0-B478-739A6C7ABCF0}"/>
+                <a16:creationId xmlns:a16="http://schemas.microsoft.com/office/drawing/2014/main" xmlns="" id="{43893EEA-2329-4BD0-B478-739A6C7ABCF0}"/>
               </a:ext>
             </a:extLst>
           </p:cNvPr>
@@ -179,7 +179,7 @@
           <p:cNvPr id="3" name="Subtitle 2">
             <a:extLst>
               <a:ext uri="{FF2B5EF4-FFF2-40B4-BE49-F238E27FC236}">
-                <a16:creationId xmlns:a16="http://schemas.microsoft.com/office/drawing/2014/main" id="{531605D0-F659-4B16-AC48-FAB20C96C441}"/>
+                <a16:creationId xmlns:a16="http://schemas.microsoft.com/office/drawing/2014/main" xmlns="" id="{531605D0-F659-4B16-AC48-FAB20C96C441}"/>
               </a:ext>
             </a:extLst>
           </p:cNvPr>
@@ -250,7 +250,7 @@
           <p:cNvPr id="4" name="Date Placeholder 3">
             <a:extLst>
               <a:ext uri="{FF2B5EF4-FFF2-40B4-BE49-F238E27FC236}">
-                <a16:creationId xmlns:a16="http://schemas.microsoft.com/office/drawing/2014/main" id="{93D4AC05-CC9D-42D0-84E8-09581B533C5C}"/>
+                <a16:creationId xmlns:a16="http://schemas.microsoft.com/office/drawing/2014/main" xmlns="" id="{93D4AC05-CC9D-42D0-84E8-09581B533C5C}"/>
               </a:ext>
             </a:extLst>
           </p:cNvPr>
@@ -268,7 +268,7 @@
           <a:p>
             <a:fld id="{5F9021A5-5D2C-4FF7-8FBA-B61BDE30AE1B}" type="datetimeFigureOut">
               <a:rPr lang="en-GB" smtClean="0"/>
-              <a:t>17/01/2019</a:t>
+              <a:t>21/01/2019</a:t>
             </a:fld>
             <a:endParaRPr lang="en-GB"/>
           </a:p>
@@ -279,7 +279,7 @@
           <p:cNvPr id="5" name="Footer Placeholder 4">
             <a:extLst>
               <a:ext uri="{FF2B5EF4-FFF2-40B4-BE49-F238E27FC236}">
-                <a16:creationId xmlns:a16="http://schemas.microsoft.com/office/drawing/2014/main" id="{46743398-C54D-4A57-BF5E-2F9CCBF7AD8E}"/>
+                <a16:creationId xmlns:a16="http://schemas.microsoft.com/office/drawing/2014/main" xmlns="" id="{46743398-C54D-4A57-BF5E-2F9CCBF7AD8E}"/>
               </a:ext>
             </a:extLst>
           </p:cNvPr>
@@ -304,7 +304,7 @@
           <p:cNvPr id="6" name="Slide Number Placeholder 5">
             <a:extLst>
               <a:ext uri="{FF2B5EF4-FFF2-40B4-BE49-F238E27FC236}">
-                <a16:creationId xmlns:a16="http://schemas.microsoft.com/office/drawing/2014/main" id="{293D33B5-B583-4617-A9FB-E821C101CC1C}"/>
+                <a16:creationId xmlns:a16="http://schemas.microsoft.com/office/drawing/2014/main" xmlns="" id="{293D33B5-B583-4617-A9FB-E821C101CC1C}"/>
               </a:ext>
             </a:extLst>
           </p:cNvPr>
@@ -363,7 +363,7 @@
           <p:cNvPr id="2" name="Title 1">
             <a:extLst>
               <a:ext uri="{FF2B5EF4-FFF2-40B4-BE49-F238E27FC236}">
-                <a16:creationId xmlns:a16="http://schemas.microsoft.com/office/drawing/2014/main" id="{314ADEF8-05FE-4481-A0CD-4171AAE11D48}"/>
+                <a16:creationId xmlns:a16="http://schemas.microsoft.com/office/drawing/2014/main" xmlns="" id="{314ADEF8-05FE-4481-A0CD-4171AAE11D48}"/>
               </a:ext>
             </a:extLst>
           </p:cNvPr>
@@ -392,7 +392,7 @@
           <p:cNvPr id="3" name="Vertical Text Placeholder 2">
             <a:extLst>
               <a:ext uri="{FF2B5EF4-FFF2-40B4-BE49-F238E27FC236}">
-                <a16:creationId xmlns:a16="http://schemas.microsoft.com/office/drawing/2014/main" id="{5E908463-0914-4437-A47B-D68282B6FB8C}"/>
+                <a16:creationId xmlns:a16="http://schemas.microsoft.com/office/drawing/2014/main" xmlns="" id="{5E908463-0914-4437-A47B-D68282B6FB8C}"/>
               </a:ext>
             </a:extLst>
           </p:cNvPr>
@@ -450,7 +450,7 @@
           <p:cNvPr id="4" name="Date Placeholder 3">
             <a:extLst>
               <a:ext uri="{FF2B5EF4-FFF2-40B4-BE49-F238E27FC236}">
-                <a16:creationId xmlns:a16="http://schemas.microsoft.com/office/drawing/2014/main" id="{81D83EF5-AF96-4C6C-B681-1D0F9EA551CA}"/>
+                <a16:creationId xmlns:a16="http://schemas.microsoft.com/office/drawing/2014/main" xmlns="" id="{81D83EF5-AF96-4C6C-B681-1D0F9EA551CA}"/>
               </a:ext>
             </a:extLst>
           </p:cNvPr>
@@ -468,7 +468,7 @@
           <a:p>
             <a:fld id="{5F9021A5-5D2C-4FF7-8FBA-B61BDE30AE1B}" type="datetimeFigureOut">
               <a:rPr lang="en-GB" smtClean="0"/>
-              <a:t>17/01/2019</a:t>
+              <a:t>21/01/2019</a:t>
             </a:fld>
             <a:endParaRPr lang="en-GB"/>
           </a:p>
@@ -479,7 +479,7 @@
           <p:cNvPr id="5" name="Footer Placeholder 4">
             <a:extLst>
               <a:ext uri="{FF2B5EF4-FFF2-40B4-BE49-F238E27FC236}">
-                <a16:creationId xmlns:a16="http://schemas.microsoft.com/office/drawing/2014/main" id="{879BFB5F-577E-4981-9AE6-B24D3E539B48}"/>
+                <a16:creationId xmlns:a16="http://schemas.microsoft.com/office/drawing/2014/main" xmlns="" id="{879BFB5F-577E-4981-9AE6-B24D3E539B48}"/>
               </a:ext>
             </a:extLst>
           </p:cNvPr>
@@ -504,7 +504,7 @@
           <p:cNvPr id="6" name="Slide Number Placeholder 5">
             <a:extLst>
               <a:ext uri="{FF2B5EF4-FFF2-40B4-BE49-F238E27FC236}">
-                <a16:creationId xmlns:a16="http://schemas.microsoft.com/office/drawing/2014/main" id="{D7820A4B-1CBA-4F7A-80C2-D60C2D0EF088}"/>
+                <a16:creationId xmlns:a16="http://schemas.microsoft.com/office/drawing/2014/main" xmlns="" id="{D7820A4B-1CBA-4F7A-80C2-D60C2D0EF088}"/>
               </a:ext>
             </a:extLst>
           </p:cNvPr>
@@ -563,7 +563,7 @@
           <p:cNvPr id="2" name="Vertical Title 1">
             <a:extLst>
               <a:ext uri="{FF2B5EF4-FFF2-40B4-BE49-F238E27FC236}">
-                <a16:creationId xmlns:a16="http://schemas.microsoft.com/office/drawing/2014/main" id="{DB1495EA-AD95-4217-ADFE-C74EE06F7230}"/>
+                <a16:creationId xmlns:a16="http://schemas.microsoft.com/office/drawing/2014/main" xmlns="" id="{DB1495EA-AD95-4217-ADFE-C74EE06F7230}"/>
               </a:ext>
             </a:extLst>
           </p:cNvPr>
@@ -597,7 +597,7 @@
           <p:cNvPr id="3" name="Vertical Text Placeholder 2">
             <a:extLst>
               <a:ext uri="{FF2B5EF4-FFF2-40B4-BE49-F238E27FC236}">
-                <a16:creationId xmlns:a16="http://schemas.microsoft.com/office/drawing/2014/main" id="{48459CC8-1F49-4AD5-B4F5-DE425DE64018}"/>
+                <a16:creationId xmlns:a16="http://schemas.microsoft.com/office/drawing/2014/main" xmlns="" id="{48459CC8-1F49-4AD5-B4F5-DE425DE64018}"/>
               </a:ext>
             </a:extLst>
           </p:cNvPr>
@@ -660,7 +660,7 @@
           <p:cNvPr id="4" name="Date Placeholder 3">
             <a:extLst>
               <a:ext uri="{FF2B5EF4-FFF2-40B4-BE49-F238E27FC236}">
-                <a16:creationId xmlns:a16="http://schemas.microsoft.com/office/drawing/2014/main" id="{646BFF7C-62E9-445A-AA43-951D025A0B29}"/>
+                <a16:creationId xmlns:a16="http://schemas.microsoft.com/office/drawing/2014/main" xmlns="" id="{646BFF7C-62E9-445A-AA43-951D025A0B29}"/>
               </a:ext>
             </a:extLst>
           </p:cNvPr>
@@ -678,7 +678,7 @@
           <a:p>
             <a:fld id="{5F9021A5-5D2C-4FF7-8FBA-B61BDE30AE1B}" type="datetimeFigureOut">
               <a:rPr lang="en-GB" smtClean="0"/>
-              <a:t>17/01/2019</a:t>
+              <a:t>21/01/2019</a:t>
             </a:fld>
             <a:endParaRPr lang="en-GB"/>
           </a:p>
@@ -689,7 +689,7 @@
           <p:cNvPr id="5" name="Footer Placeholder 4">
             <a:extLst>
               <a:ext uri="{FF2B5EF4-FFF2-40B4-BE49-F238E27FC236}">
-                <a16:creationId xmlns:a16="http://schemas.microsoft.com/office/drawing/2014/main" id="{3F3DF7E9-367F-4DF0-B4C9-6DB26AA61F6F}"/>
+                <a16:creationId xmlns:a16="http://schemas.microsoft.com/office/drawing/2014/main" xmlns="" id="{3F3DF7E9-367F-4DF0-B4C9-6DB26AA61F6F}"/>
               </a:ext>
             </a:extLst>
           </p:cNvPr>
@@ -714,7 +714,7 @@
           <p:cNvPr id="6" name="Slide Number Placeholder 5">
             <a:extLst>
               <a:ext uri="{FF2B5EF4-FFF2-40B4-BE49-F238E27FC236}">
-                <a16:creationId xmlns:a16="http://schemas.microsoft.com/office/drawing/2014/main" id="{636A9102-5136-4872-BE70-EC792DFF0419}"/>
+                <a16:creationId xmlns:a16="http://schemas.microsoft.com/office/drawing/2014/main" xmlns="" id="{636A9102-5136-4872-BE70-EC792DFF0419}"/>
               </a:ext>
             </a:extLst>
           </p:cNvPr>
@@ -773,7 +773,7 @@
           <p:cNvPr id="2" name="Title 1">
             <a:extLst>
               <a:ext uri="{FF2B5EF4-FFF2-40B4-BE49-F238E27FC236}">
-                <a16:creationId xmlns:a16="http://schemas.microsoft.com/office/drawing/2014/main" id="{ED3170B7-C55B-43D2-87DB-7F752FE3F129}"/>
+                <a16:creationId xmlns:a16="http://schemas.microsoft.com/office/drawing/2014/main" xmlns="" id="{ED3170B7-C55B-43D2-87DB-7F752FE3F129}"/>
               </a:ext>
             </a:extLst>
           </p:cNvPr>
@@ -802,7 +802,7 @@
           <p:cNvPr id="3" name="Content Placeholder 2">
             <a:extLst>
               <a:ext uri="{FF2B5EF4-FFF2-40B4-BE49-F238E27FC236}">
-                <a16:creationId xmlns:a16="http://schemas.microsoft.com/office/drawing/2014/main" id="{EBEFDF05-3DA5-468F-9962-9DEBFA346A5E}"/>
+                <a16:creationId xmlns:a16="http://schemas.microsoft.com/office/drawing/2014/main" xmlns="" id="{EBEFDF05-3DA5-468F-9962-9DEBFA346A5E}"/>
               </a:ext>
             </a:extLst>
           </p:cNvPr>
@@ -860,7 +860,7 @@
           <p:cNvPr id="4" name="Date Placeholder 3">
             <a:extLst>
               <a:ext uri="{FF2B5EF4-FFF2-40B4-BE49-F238E27FC236}">
-                <a16:creationId xmlns:a16="http://schemas.microsoft.com/office/drawing/2014/main" id="{4C6D3837-121B-454C-9B58-89764A7CDCF4}"/>
+                <a16:creationId xmlns:a16="http://schemas.microsoft.com/office/drawing/2014/main" xmlns="" id="{4C6D3837-121B-454C-9B58-89764A7CDCF4}"/>
               </a:ext>
             </a:extLst>
           </p:cNvPr>
@@ -878,7 +878,7 @@
           <a:p>
             <a:fld id="{5F9021A5-5D2C-4FF7-8FBA-B61BDE30AE1B}" type="datetimeFigureOut">
               <a:rPr lang="en-GB" smtClean="0"/>
-              <a:t>17/01/2019</a:t>
+              <a:t>21/01/2019</a:t>
             </a:fld>
             <a:endParaRPr lang="en-GB"/>
           </a:p>
@@ -889,7 +889,7 @@
           <p:cNvPr id="5" name="Footer Placeholder 4">
             <a:extLst>
               <a:ext uri="{FF2B5EF4-FFF2-40B4-BE49-F238E27FC236}">
-                <a16:creationId xmlns:a16="http://schemas.microsoft.com/office/drawing/2014/main" id="{92837F7C-94A1-499C-B0B9-FEB23234D3A1}"/>
+                <a16:creationId xmlns:a16="http://schemas.microsoft.com/office/drawing/2014/main" xmlns="" id="{92837F7C-94A1-499C-B0B9-FEB23234D3A1}"/>
               </a:ext>
             </a:extLst>
           </p:cNvPr>
@@ -914,7 +914,7 @@
           <p:cNvPr id="6" name="Slide Number Placeholder 5">
             <a:extLst>
               <a:ext uri="{FF2B5EF4-FFF2-40B4-BE49-F238E27FC236}">
-                <a16:creationId xmlns:a16="http://schemas.microsoft.com/office/drawing/2014/main" id="{5A9AB361-1F50-493B-9CEA-1C308245FCAC}"/>
+                <a16:creationId xmlns:a16="http://schemas.microsoft.com/office/drawing/2014/main" xmlns="" id="{5A9AB361-1F50-493B-9CEA-1C308245FCAC}"/>
               </a:ext>
             </a:extLst>
           </p:cNvPr>
@@ -973,7 +973,7 @@
           <p:cNvPr id="2" name="Title 1">
             <a:extLst>
               <a:ext uri="{FF2B5EF4-FFF2-40B4-BE49-F238E27FC236}">
-                <a16:creationId xmlns:a16="http://schemas.microsoft.com/office/drawing/2014/main" id="{A17FBDA1-9A04-4813-999D-D3EF005F657B}"/>
+                <a16:creationId xmlns:a16="http://schemas.microsoft.com/office/drawing/2014/main" xmlns="" id="{A17FBDA1-9A04-4813-999D-D3EF005F657B}"/>
               </a:ext>
             </a:extLst>
           </p:cNvPr>
@@ -1011,7 +1011,7 @@
           <p:cNvPr id="3" name="Text Placeholder 2">
             <a:extLst>
               <a:ext uri="{FF2B5EF4-FFF2-40B4-BE49-F238E27FC236}">
-                <a16:creationId xmlns:a16="http://schemas.microsoft.com/office/drawing/2014/main" id="{49A7C322-5A28-4763-9759-05815EBAF58D}"/>
+                <a16:creationId xmlns:a16="http://schemas.microsoft.com/office/drawing/2014/main" xmlns="" id="{49A7C322-5A28-4763-9759-05815EBAF58D}"/>
               </a:ext>
             </a:extLst>
           </p:cNvPr>
@@ -1136,7 +1136,7 @@
           <p:cNvPr id="4" name="Date Placeholder 3">
             <a:extLst>
               <a:ext uri="{FF2B5EF4-FFF2-40B4-BE49-F238E27FC236}">
-                <a16:creationId xmlns:a16="http://schemas.microsoft.com/office/drawing/2014/main" id="{43B08A97-8825-4B0E-B6FA-C30D395BE6D1}"/>
+                <a16:creationId xmlns:a16="http://schemas.microsoft.com/office/drawing/2014/main" xmlns="" id="{43B08A97-8825-4B0E-B6FA-C30D395BE6D1}"/>
               </a:ext>
             </a:extLst>
           </p:cNvPr>
@@ -1154,7 +1154,7 @@
           <a:p>
             <a:fld id="{5F9021A5-5D2C-4FF7-8FBA-B61BDE30AE1B}" type="datetimeFigureOut">
               <a:rPr lang="en-GB" smtClean="0"/>
-              <a:t>17/01/2019</a:t>
+              <a:t>21/01/2019</a:t>
             </a:fld>
             <a:endParaRPr lang="en-GB"/>
           </a:p>
@@ -1165,7 +1165,7 @@
           <p:cNvPr id="5" name="Footer Placeholder 4">
             <a:extLst>
               <a:ext uri="{FF2B5EF4-FFF2-40B4-BE49-F238E27FC236}">
-                <a16:creationId xmlns:a16="http://schemas.microsoft.com/office/drawing/2014/main" id="{E2A7D5A2-489A-44BE-95BA-C41FF13D1C65}"/>
+                <a16:creationId xmlns:a16="http://schemas.microsoft.com/office/drawing/2014/main" xmlns="" id="{E2A7D5A2-489A-44BE-95BA-C41FF13D1C65}"/>
               </a:ext>
             </a:extLst>
           </p:cNvPr>
@@ -1190,7 +1190,7 @@
           <p:cNvPr id="6" name="Slide Number Placeholder 5">
             <a:extLst>
               <a:ext uri="{FF2B5EF4-FFF2-40B4-BE49-F238E27FC236}">
-                <a16:creationId xmlns:a16="http://schemas.microsoft.com/office/drawing/2014/main" id="{7772E596-F9BA-4EA1-B777-69A74090D7FB}"/>
+                <a16:creationId xmlns:a16="http://schemas.microsoft.com/office/drawing/2014/main" xmlns="" id="{7772E596-F9BA-4EA1-B777-69A74090D7FB}"/>
               </a:ext>
             </a:extLst>
           </p:cNvPr>
@@ -1249,7 +1249,7 @@
           <p:cNvPr id="2" name="Title 1">
             <a:extLst>
               <a:ext uri="{FF2B5EF4-FFF2-40B4-BE49-F238E27FC236}">
-                <a16:creationId xmlns:a16="http://schemas.microsoft.com/office/drawing/2014/main" id="{AA18BF10-E166-4004-B0EB-5269B3668265}"/>
+                <a16:creationId xmlns:a16="http://schemas.microsoft.com/office/drawing/2014/main" xmlns="" id="{AA18BF10-E166-4004-B0EB-5269B3668265}"/>
               </a:ext>
             </a:extLst>
           </p:cNvPr>
@@ -1278,7 +1278,7 @@
           <p:cNvPr id="3" name="Content Placeholder 2">
             <a:extLst>
               <a:ext uri="{FF2B5EF4-FFF2-40B4-BE49-F238E27FC236}">
-                <a16:creationId xmlns:a16="http://schemas.microsoft.com/office/drawing/2014/main" id="{333510AE-E4AB-4DF1-875B-EC5FD0F0F1A5}"/>
+                <a16:creationId xmlns:a16="http://schemas.microsoft.com/office/drawing/2014/main" xmlns="" id="{333510AE-E4AB-4DF1-875B-EC5FD0F0F1A5}"/>
               </a:ext>
             </a:extLst>
           </p:cNvPr>
@@ -1341,7 +1341,7 @@
           <p:cNvPr id="4" name="Content Placeholder 3">
             <a:extLst>
               <a:ext uri="{FF2B5EF4-FFF2-40B4-BE49-F238E27FC236}">
-                <a16:creationId xmlns:a16="http://schemas.microsoft.com/office/drawing/2014/main" id="{5403E092-1374-49AB-991A-C900840AB9C5}"/>
+                <a16:creationId xmlns:a16="http://schemas.microsoft.com/office/drawing/2014/main" xmlns="" id="{5403E092-1374-49AB-991A-C900840AB9C5}"/>
               </a:ext>
             </a:extLst>
           </p:cNvPr>
@@ -1404,7 +1404,7 @@
           <p:cNvPr id="5" name="Date Placeholder 4">
             <a:extLst>
               <a:ext uri="{FF2B5EF4-FFF2-40B4-BE49-F238E27FC236}">
-                <a16:creationId xmlns:a16="http://schemas.microsoft.com/office/drawing/2014/main" id="{3A5F1F22-838A-4EC3-8DE2-25F126F5BE77}"/>
+                <a16:creationId xmlns:a16="http://schemas.microsoft.com/office/drawing/2014/main" xmlns="" id="{3A5F1F22-838A-4EC3-8DE2-25F126F5BE77}"/>
               </a:ext>
             </a:extLst>
           </p:cNvPr>
@@ -1422,7 +1422,7 @@
           <a:p>
             <a:fld id="{5F9021A5-5D2C-4FF7-8FBA-B61BDE30AE1B}" type="datetimeFigureOut">
               <a:rPr lang="en-GB" smtClean="0"/>
-              <a:t>17/01/2019</a:t>
+              <a:t>21/01/2019</a:t>
             </a:fld>
             <a:endParaRPr lang="en-GB"/>
           </a:p>
@@ -1433,7 +1433,7 @@
           <p:cNvPr id="6" name="Footer Placeholder 5">
             <a:extLst>
               <a:ext uri="{FF2B5EF4-FFF2-40B4-BE49-F238E27FC236}">
-                <a16:creationId xmlns:a16="http://schemas.microsoft.com/office/drawing/2014/main" id="{884FA1F6-2855-4448-8E6C-887074463914}"/>
+                <a16:creationId xmlns:a16="http://schemas.microsoft.com/office/drawing/2014/main" xmlns="" id="{884FA1F6-2855-4448-8E6C-887074463914}"/>
               </a:ext>
             </a:extLst>
           </p:cNvPr>
@@ -1458,7 +1458,7 @@
           <p:cNvPr id="7" name="Slide Number Placeholder 6">
             <a:extLst>
               <a:ext uri="{FF2B5EF4-FFF2-40B4-BE49-F238E27FC236}">
-                <a16:creationId xmlns:a16="http://schemas.microsoft.com/office/drawing/2014/main" id="{192DFC1C-DC54-4391-BC39-EFE932710B9D}"/>
+                <a16:creationId xmlns:a16="http://schemas.microsoft.com/office/drawing/2014/main" xmlns="" id="{192DFC1C-DC54-4391-BC39-EFE932710B9D}"/>
               </a:ext>
             </a:extLst>
           </p:cNvPr>
@@ -1517,7 +1517,7 @@
           <p:cNvPr id="2" name="Title 1">
             <a:extLst>
               <a:ext uri="{FF2B5EF4-FFF2-40B4-BE49-F238E27FC236}">
-                <a16:creationId xmlns:a16="http://schemas.microsoft.com/office/drawing/2014/main" id="{F35FB1A5-06D9-45FF-9AFB-C4F0C69E68D7}"/>
+                <a16:creationId xmlns:a16="http://schemas.microsoft.com/office/drawing/2014/main" xmlns="" id="{F35FB1A5-06D9-45FF-9AFB-C4F0C69E68D7}"/>
               </a:ext>
             </a:extLst>
           </p:cNvPr>
@@ -1551,7 +1551,7 @@
           <p:cNvPr id="3" name="Text Placeholder 2">
             <a:extLst>
               <a:ext uri="{FF2B5EF4-FFF2-40B4-BE49-F238E27FC236}">
-                <a16:creationId xmlns:a16="http://schemas.microsoft.com/office/drawing/2014/main" id="{50084235-CC21-448C-98EE-C8FED28F8B67}"/>
+                <a16:creationId xmlns:a16="http://schemas.microsoft.com/office/drawing/2014/main" xmlns="" id="{50084235-CC21-448C-98EE-C8FED28F8B67}"/>
               </a:ext>
             </a:extLst>
           </p:cNvPr>
@@ -1622,7 +1622,7 @@
           <p:cNvPr id="4" name="Content Placeholder 3">
             <a:extLst>
               <a:ext uri="{FF2B5EF4-FFF2-40B4-BE49-F238E27FC236}">
-                <a16:creationId xmlns:a16="http://schemas.microsoft.com/office/drawing/2014/main" id="{7D6955AF-5C0F-4296-A116-5CD28C92E290}"/>
+                <a16:creationId xmlns:a16="http://schemas.microsoft.com/office/drawing/2014/main" xmlns="" id="{7D6955AF-5C0F-4296-A116-5CD28C92E290}"/>
               </a:ext>
             </a:extLst>
           </p:cNvPr>
@@ -1685,7 +1685,7 @@
           <p:cNvPr id="5" name="Text Placeholder 4">
             <a:extLst>
               <a:ext uri="{FF2B5EF4-FFF2-40B4-BE49-F238E27FC236}">
-                <a16:creationId xmlns:a16="http://schemas.microsoft.com/office/drawing/2014/main" id="{58A0C3B2-4658-4D67-A3FF-49F1C083E97E}"/>
+                <a16:creationId xmlns:a16="http://schemas.microsoft.com/office/drawing/2014/main" xmlns="" id="{58A0C3B2-4658-4D67-A3FF-49F1C083E97E}"/>
               </a:ext>
             </a:extLst>
           </p:cNvPr>
@@ -1756,7 +1756,7 @@
           <p:cNvPr id="6" name="Content Placeholder 5">
             <a:extLst>
               <a:ext uri="{FF2B5EF4-FFF2-40B4-BE49-F238E27FC236}">
-                <a16:creationId xmlns:a16="http://schemas.microsoft.com/office/drawing/2014/main" id="{21D4CD37-FE65-4127-B060-B3E7323C5C93}"/>
+                <a16:creationId xmlns:a16="http://schemas.microsoft.com/office/drawing/2014/main" xmlns="" id="{21D4CD37-FE65-4127-B060-B3E7323C5C93}"/>
               </a:ext>
             </a:extLst>
           </p:cNvPr>
@@ -1819,7 +1819,7 @@
           <p:cNvPr id="7" name="Date Placeholder 6">
             <a:extLst>
               <a:ext uri="{FF2B5EF4-FFF2-40B4-BE49-F238E27FC236}">
-                <a16:creationId xmlns:a16="http://schemas.microsoft.com/office/drawing/2014/main" id="{645BB935-10CF-49D0-9C83-6AE073BB7BA2}"/>
+                <a16:creationId xmlns:a16="http://schemas.microsoft.com/office/drawing/2014/main" xmlns="" id="{645BB935-10CF-49D0-9C83-6AE073BB7BA2}"/>
               </a:ext>
             </a:extLst>
           </p:cNvPr>
@@ -1837,7 +1837,7 @@
           <a:p>
             <a:fld id="{5F9021A5-5D2C-4FF7-8FBA-B61BDE30AE1B}" type="datetimeFigureOut">
               <a:rPr lang="en-GB" smtClean="0"/>
-              <a:t>17/01/2019</a:t>
+              <a:t>21/01/2019</a:t>
             </a:fld>
             <a:endParaRPr lang="en-GB"/>
           </a:p>
@@ -1848,7 +1848,7 @@
           <p:cNvPr id="8" name="Footer Placeholder 7">
             <a:extLst>
               <a:ext uri="{FF2B5EF4-FFF2-40B4-BE49-F238E27FC236}">
-                <a16:creationId xmlns:a16="http://schemas.microsoft.com/office/drawing/2014/main" id="{66189B88-9CE4-44FF-BC06-2CA077FFA825}"/>
+                <a16:creationId xmlns:a16="http://schemas.microsoft.com/office/drawing/2014/main" xmlns="" id="{66189B88-9CE4-44FF-BC06-2CA077FFA825}"/>
               </a:ext>
             </a:extLst>
           </p:cNvPr>
@@ -1873,7 +1873,7 @@
           <p:cNvPr id="9" name="Slide Number Placeholder 8">
             <a:extLst>
               <a:ext uri="{FF2B5EF4-FFF2-40B4-BE49-F238E27FC236}">
-                <a16:creationId xmlns:a16="http://schemas.microsoft.com/office/drawing/2014/main" id="{05E0D7D3-5513-4B83-B7B5-23F6F2952FBE}"/>
+                <a16:creationId xmlns:a16="http://schemas.microsoft.com/office/drawing/2014/main" xmlns="" id="{05E0D7D3-5513-4B83-B7B5-23F6F2952FBE}"/>
               </a:ext>
             </a:extLst>
           </p:cNvPr>
@@ -1932,7 +1932,7 @@
           <p:cNvPr id="2" name="Title 1">
             <a:extLst>
               <a:ext uri="{FF2B5EF4-FFF2-40B4-BE49-F238E27FC236}">
-                <a16:creationId xmlns:a16="http://schemas.microsoft.com/office/drawing/2014/main" id="{200DF880-9650-47A3-B764-4A8EE9FF4B53}"/>
+                <a16:creationId xmlns:a16="http://schemas.microsoft.com/office/drawing/2014/main" xmlns="" id="{200DF880-9650-47A3-B764-4A8EE9FF4B53}"/>
               </a:ext>
             </a:extLst>
           </p:cNvPr>
@@ -1961,7 +1961,7 @@
           <p:cNvPr id="3" name="Date Placeholder 2">
             <a:extLst>
               <a:ext uri="{FF2B5EF4-FFF2-40B4-BE49-F238E27FC236}">
-                <a16:creationId xmlns:a16="http://schemas.microsoft.com/office/drawing/2014/main" id="{74259FFF-FD9C-4749-98DA-29A82BEBA21F}"/>
+                <a16:creationId xmlns:a16="http://schemas.microsoft.com/office/drawing/2014/main" xmlns="" id="{74259FFF-FD9C-4749-98DA-29A82BEBA21F}"/>
               </a:ext>
             </a:extLst>
           </p:cNvPr>
@@ -1979,7 +1979,7 @@
           <a:p>
             <a:fld id="{5F9021A5-5D2C-4FF7-8FBA-B61BDE30AE1B}" type="datetimeFigureOut">
               <a:rPr lang="en-GB" smtClean="0"/>
-              <a:t>17/01/2019</a:t>
+              <a:t>21/01/2019</a:t>
             </a:fld>
             <a:endParaRPr lang="en-GB"/>
           </a:p>
@@ -1990,7 +1990,7 @@
           <p:cNvPr id="4" name="Footer Placeholder 3">
             <a:extLst>
               <a:ext uri="{FF2B5EF4-FFF2-40B4-BE49-F238E27FC236}">
-                <a16:creationId xmlns:a16="http://schemas.microsoft.com/office/drawing/2014/main" id="{0C93E6D4-42C7-4396-83F5-C706FABE2BB2}"/>
+                <a16:creationId xmlns:a16="http://schemas.microsoft.com/office/drawing/2014/main" xmlns="" id="{0C93E6D4-42C7-4396-83F5-C706FABE2BB2}"/>
               </a:ext>
             </a:extLst>
           </p:cNvPr>
@@ -2015,7 +2015,7 @@
           <p:cNvPr id="5" name="Slide Number Placeholder 4">
             <a:extLst>
               <a:ext uri="{FF2B5EF4-FFF2-40B4-BE49-F238E27FC236}">
-                <a16:creationId xmlns:a16="http://schemas.microsoft.com/office/drawing/2014/main" id="{751E6D9E-3936-46CA-85A8-0E03995DC49A}"/>
+                <a16:creationId xmlns:a16="http://schemas.microsoft.com/office/drawing/2014/main" xmlns="" id="{751E6D9E-3936-46CA-85A8-0E03995DC49A}"/>
               </a:ext>
             </a:extLst>
           </p:cNvPr>
@@ -2074,7 +2074,7 @@
           <p:cNvPr id="2" name="Date Placeholder 1">
             <a:extLst>
               <a:ext uri="{FF2B5EF4-FFF2-40B4-BE49-F238E27FC236}">
-                <a16:creationId xmlns:a16="http://schemas.microsoft.com/office/drawing/2014/main" id="{FE2556F9-C98E-4E78-AE79-E9A3E8EC0A1F}"/>
+                <a16:creationId xmlns:a16="http://schemas.microsoft.com/office/drawing/2014/main" xmlns="" id="{FE2556F9-C98E-4E78-AE79-E9A3E8EC0A1F}"/>
               </a:ext>
             </a:extLst>
           </p:cNvPr>
@@ -2092,7 +2092,7 @@
           <a:p>
             <a:fld id="{5F9021A5-5D2C-4FF7-8FBA-B61BDE30AE1B}" type="datetimeFigureOut">
               <a:rPr lang="en-GB" smtClean="0"/>
-              <a:t>17/01/2019</a:t>
+              <a:t>21/01/2019</a:t>
             </a:fld>
             <a:endParaRPr lang="en-GB"/>
           </a:p>
@@ -2103,7 +2103,7 @@
           <p:cNvPr id="3" name="Footer Placeholder 2">
             <a:extLst>
               <a:ext uri="{FF2B5EF4-FFF2-40B4-BE49-F238E27FC236}">
-                <a16:creationId xmlns:a16="http://schemas.microsoft.com/office/drawing/2014/main" id="{5E58EFB7-EF90-4E5C-88BB-C67B2E6D5FCA}"/>
+                <a16:creationId xmlns:a16="http://schemas.microsoft.com/office/drawing/2014/main" xmlns="" id="{5E58EFB7-EF90-4E5C-88BB-C67B2E6D5FCA}"/>
               </a:ext>
             </a:extLst>
           </p:cNvPr>
@@ -2128,7 +2128,7 @@
           <p:cNvPr id="4" name="Slide Number Placeholder 3">
             <a:extLst>
               <a:ext uri="{FF2B5EF4-FFF2-40B4-BE49-F238E27FC236}">
-                <a16:creationId xmlns:a16="http://schemas.microsoft.com/office/drawing/2014/main" id="{E9539145-7624-4814-9BFE-B315EDCE9F72}"/>
+                <a16:creationId xmlns:a16="http://schemas.microsoft.com/office/drawing/2014/main" xmlns="" id="{E9539145-7624-4814-9BFE-B315EDCE9F72}"/>
               </a:ext>
             </a:extLst>
           </p:cNvPr>
@@ -2187,7 +2187,7 @@
           <p:cNvPr id="2" name="Title 1">
             <a:extLst>
               <a:ext uri="{FF2B5EF4-FFF2-40B4-BE49-F238E27FC236}">
-                <a16:creationId xmlns:a16="http://schemas.microsoft.com/office/drawing/2014/main" id="{14E37E2D-94B8-4937-9D19-073CF5073DCA}"/>
+                <a16:creationId xmlns:a16="http://schemas.microsoft.com/office/drawing/2014/main" xmlns="" id="{14E37E2D-94B8-4937-9D19-073CF5073DCA}"/>
               </a:ext>
             </a:extLst>
           </p:cNvPr>
@@ -2225,7 +2225,7 @@
           <p:cNvPr id="3" name="Content Placeholder 2">
             <a:extLst>
               <a:ext uri="{FF2B5EF4-FFF2-40B4-BE49-F238E27FC236}">
-                <a16:creationId xmlns:a16="http://schemas.microsoft.com/office/drawing/2014/main" id="{26BF1181-E9F7-4D60-B81C-A8AC8024327A}"/>
+                <a16:creationId xmlns:a16="http://schemas.microsoft.com/office/drawing/2014/main" xmlns="" id="{26BF1181-E9F7-4D60-B81C-A8AC8024327A}"/>
               </a:ext>
             </a:extLst>
           </p:cNvPr>
@@ -2316,7 +2316,7 @@
           <p:cNvPr id="4" name="Text Placeholder 3">
             <a:extLst>
               <a:ext uri="{FF2B5EF4-FFF2-40B4-BE49-F238E27FC236}">
-                <a16:creationId xmlns:a16="http://schemas.microsoft.com/office/drawing/2014/main" id="{9433EB85-D118-401F-92A7-15F6C5BBAD38}"/>
+                <a16:creationId xmlns:a16="http://schemas.microsoft.com/office/drawing/2014/main" xmlns="" id="{9433EB85-D118-401F-92A7-15F6C5BBAD38}"/>
               </a:ext>
             </a:extLst>
           </p:cNvPr>
@@ -2387,7 +2387,7 @@
           <p:cNvPr id="5" name="Date Placeholder 4">
             <a:extLst>
               <a:ext uri="{FF2B5EF4-FFF2-40B4-BE49-F238E27FC236}">
-                <a16:creationId xmlns:a16="http://schemas.microsoft.com/office/drawing/2014/main" id="{DA607528-5B49-4DD3-9132-30881DE87B4D}"/>
+                <a16:creationId xmlns:a16="http://schemas.microsoft.com/office/drawing/2014/main" xmlns="" id="{DA607528-5B49-4DD3-9132-30881DE87B4D}"/>
               </a:ext>
             </a:extLst>
           </p:cNvPr>
@@ -2405,7 +2405,7 @@
           <a:p>
             <a:fld id="{5F9021A5-5D2C-4FF7-8FBA-B61BDE30AE1B}" type="datetimeFigureOut">
               <a:rPr lang="en-GB" smtClean="0"/>
-              <a:t>17/01/2019</a:t>
+              <a:t>21/01/2019</a:t>
             </a:fld>
             <a:endParaRPr lang="en-GB"/>
           </a:p>
@@ -2416,7 +2416,7 @@
           <p:cNvPr id="6" name="Footer Placeholder 5">
             <a:extLst>
               <a:ext uri="{FF2B5EF4-FFF2-40B4-BE49-F238E27FC236}">
-                <a16:creationId xmlns:a16="http://schemas.microsoft.com/office/drawing/2014/main" id="{455BA862-992C-43CA-B5C2-4C0430B2F039}"/>
+                <a16:creationId xmlns:a16="http://schemas.microsoft.com/office/drawing/2014/main" xmlns="" id="{455BA862-992C-43CA-B5C2-4C0430B2F039}"/>
               </a:ext>
             </a:extLst>
           </p:cNvPr>
@@ -2441,7 +2441,7 @@
           <p:cNvPr id="7" name="Slide Number Placeholder 6">
             <a:extLst>
               <a:ext uri="{FF2B5EF4-FFF2-40B4-BE49-F238E27FC236}">
-                <a16:creationId xmlns:a16="http://schemas.microsoft.com/office/drawing/2014/main" id="{38D26D8D-2712-4B8C-BF2E-9C5B39AEBD41}"/>
+                <a16:creationId xmlns:a16="http://schemas.microsoft.com/office/drawing/2014/main" xmlns="" id="{38D26D8D-2712-4B8C-BF2E-9C5B39AEBD41}"/>
               </a:ext>
             </a:extLst>
           </p:cNvPr>
@@ -2500,7 +2500,7 @@
           <p:cNvPr id="2" name="Title 1">
             <a:extLst>
               <a:ext uri="{FF2B5EF4-FFF2-40B4-BE49-F238E27FC236}">
-                <a16:creationId xmlns:a16="http://schemas.microsoft.com/office/drawing/2014/main" id="{17A725E2-032B-437C-AB44-582C1073A509}"/>
+                <a16:creationId xmlns:a16="http://schemas.microsoft.com/office/drawing/2014/main" xmlns="" id="{17A725E2-032B-437C-AB44-582C1073A509}"/>
               </a:ext>
             </a:extLst>
           </p:cNvPr>
@@ -2538,7 +2538,7 @@
           <p:cNvPr id="3" name="Picture Placeholder 2">
             <a:extLst>
               <a:ext uri="{FF2B5EF4-FFF2-40B4-BE49-F238E27FC236}">
-                <a16:creationId xmlns:a16="http://schemas.microsoft.com/office/drawing/2014/main" id="{5F439274-0057-4242-9680-1D7A9CE6634D}"/>
+                <a16:creationId xmlns:a16="http://schemas.microsoft.com/office/drawing/2014/main" xmlns="" id="{5F439274-0057-4242-9680-1D7A9CE6634D}"/>
               </a:ext>
             </a:extLst>
           </p:cNvPr>
@@ -2605,7 +2605,7 @@
           <p:cNvPr id="4" name="Text Placeholder 3">
             <a:extLst>
               <a:ext uri="{FF2B5EF4-FFF2-40B4-BE49-F238E27FC236}">
-                <a16:creationId xmlns:a16="http://schemas.microsoft.com/office/drawing/2014/main" id="{6E3FE9FB-8CAF-425A-9101-BDEF14014742}"/>
+                <a16:creationId xmlns:a16="http://schemas.microsoft.com/office/drawing/2014/main" xmlns="" id="{6E3FE9FB-8CAF-425A-9101-BDEF14014742}"/>
               </a:ext>
             </a:extLst>
           </p:cNvPr>
@@ -2676,7 +2676,7 @@
           <p:cNvPr id="5" name="Date Placeholder 4">
             <a:extLst>
               <a:ext uri="{FF2B5EF4-FFF2-40B4-BE49-F238E27FC236}">
-                <a16:creationId xmlns:a16="http://schemas.microsoft.com/office/drawing/2014/main" id="{50C55AAC-CB8E-429F-8B0E-F46731F2830B}"/>
+                <a16:creationId xmlns:a16="http://schemas.microsoft.com/office/drawing/2014/main" xmlns="" id="{50C55AAC-CB8E-429F-8B0E-F46731F2830B}"/>
               </a:ext>
             </a:extLst>
           </p:cNvPr>
@@ -2694,7 +2694,7 @@
           <a:p>
             <a:fld id="{5F9021A5-5D2C-4FF7-8FBA-B61BDE30AE1B}" type="datetimeFigureOut">
               <a:rPr lang="en-GB" smtClean="0"/>
-              <a:t>17/01/2019</a:t>
+              <a:t>21/01/2019</a:t>
             </a:fld>
             <a:endParaRPr lang="en-GB"/>
           </a:p>
@@ -2705,7 +2705,7 @@
           <p:cNvPr id="6" name="Footer Placeholder 5">
             <a:extLst>
               <a:ext uri="{FF2B5EF4-FFF2-40B4-BE49-F238E27FC236}">
-                <a16:creationId xmlns:a16="http://schemas.microsoft.com/office/drawing/2014/main" id="{C2F8A79E-3DA5-4A2B-86FA-8C19825DEB33}"/>
+                <a16:creationId xmlns:a16="http://schemas.microsoft.com/office/drawing/2014/main" xmlns="" id="{C2F8A79E-3DA5-4A2B-86FA-8C19825DEB33}"/>
               </a:ext>
             </a:extLst>
           </p:cNvPr>
@@ -2730,7 +2730,7 @@
           <p:cNvPr id="7" name="Slide Number Placeholder 6">
             <a:extLst>
               <a:ext uri="{FF2B5EF4-FFF2-40B4-BE49-F238E27FC236}">
-                <a16:creationId xmlns:a16="http://schemas.microsoft.com/office/drawing/2014/main" id="{B5008AA0-F7C3-4DA3-B1D9-3420F7D2567D}"/>
+                <a16:creationId xmlns:a16="http://schemas.microsoft.com/office/drawing/2014/main" xmlns="" id="{B5008AA0-F7C3-4DA3-B1D9-3420F7D2567D}"/>
               </a:ext>
             </a:extLst>
           </p:cNvPr>
@@ -2794,7 +2794,7 @@
           <p:cNvPr id="2" name="Title Placeholder 1">
             <a:extLst>
               <a:ext uri="{FF2B5EF4-FFF2-40B4-BE49-F238E27FC236}">
-                <a16:creationId xmlns:a16="http://schemas.microsoft.com/office/drawing/2014/main" id="{525AF961-B3D1-4104-86B8-C10BAD57B953}"/>
+                <a16:creationId xmlns:a16="http://schemas.microsoft.com/office/drawing/2014/main" xmlns="" id="{525AF961-B3D1-4104-86B8-C10BAD57B953}"/>
               </a:ext>
             </a:extLst>
           </p:cNvPr>
@@ -2833,7 +2833,7 @@
           <p:cNvPr id="3" name="Text Placeholder 2">
             <a:extLst>
               <a:ext uri="{FF2B5EF4-FFF2-40B4-BE49-F238E27FC236}">
-                <a16:creationId xmlns:a16="http://schemas.microsoft.com/office/drawing/2014/main" id="{2F27F852-475F-4869-A573-AD1D51B3D236}"/>
+                <a16:creationId xmlns:a16="http://schemas.microsoft.com/office/drawing/2014/main" xmlns="" id="{2F27F852-475F-4869-A573-AD1D51B3D236}"/>
               </a:ext>
             </a:extLst>
           </p:cNvPr>
@@ -2901,7 +2901,7 @@
           <p:cNvPr id="4" name="Date Placeholder 3">
             <a:extLst>
               <a:ext uri="{FF2B5EF4-FFF2-40B4-BE49-F238E27FC236}">
-                <a16:creationId xmlns:a16="http://schemas.microsoft.com/office/drawing/2014/main" id="{59156039-19C9-44ED-84AF-BBFA5A788067}"/>
+                <a16:creationId xmlns:a16="http://schemas.microsoft.com/office/drawing/2014/main" xmlns="" id="{59156039-19C9-44ED-84AF-BBFA5A788067}"/>
               </a:ext>
             </a:extLst>
           </p:cNvPr>
@@ -2937,7 +2937,7 @@
           <a:p>
             <a:fld id="{5F9021A5-5D2C-4FF7-8FBA-B61BDE30AE1B}" type="datetimeFigureOut">
               <a:rPr lang="en-GB" smtClean="0"/>
-              <a:t>17/01/2019</a:t>
+              <a:t>21/01/2019</a:t>
             </a:fld>
             <a:endParaRPr lang="en-GB"/>
           </a:p>
@@ -2948,7 +2948,7 @@
           <p:cNvPr id="5" name="Footer Placeholder 4">
             <a:extLst>
               <a:ext uri="{FF2B5EF4-FFF2-40B4-BE49-F238E27FC236}">
-                <a16:creationId xmlns:a16="http://schemas.microsoft.com/office/drawing/2014/main" id="{F60107FF-CCD1-4AB6-9759-47FC7DB3CA12}"/>
+                <a16:creationId xmlns:a16="http://schemas.microsoft.com/office/drawing/2014/main" xmlns="" id="{F60107FF-CCD1-4AB6-9759-47FC7DB3CA12}"/>
               </a:ext>
             </a:extLst>
           </p:cNvPr>
@@ -2991,7 +2991,7 @@
           <p:cNvPr id="6" name="Slide Number Placeholder 5">
             <a:extLst>
               <a:ext uri="{FF2B5EF4-FFF2-40B4-BE49-F238E27FC236}">
-                <a16:creationId xmlns:a16="http://schemas.microsoft.com/office/drawing/2014/main" id="{265A53F5-9A94-4878-984D-EDCC813187E2}"/>
+                <a16:creationId xmlns:a16="http://schemas.microsoft.com/office/drawing/2014/main" xmlns="" id="{265A53F5-9A94-4878-984D-EDCC813187E2}"/>
               </a:ext>
             </a:extLst>
           </p:cNvPr>
@@ -3359,7 +3359,7 @@
           <p:cNvPr id="10" name="Group 9">
             <a:extLst>
               <a:ext uri="{FF2B5EF4-FFF2-40B4-BE49-F238E27FC236}">
-                <a16:creationId xmlns:a16="http://schemas.microsoft.com/office/drawing/2014/main" id="{DE565E46-0409-49DC-A628-3A9D99FF49A4}"/>
+                <a16:creationId xmlns:a16="http://schemas.microsoft.com/office/drawing/2014/main" xmlns="" id="{DE565E46-0409-49DC-A628-3A9D99FF49A4}"/>
               </a:ext>
             </a:extLst>
           </p:cNvPr>
@@ -3379,7 +3379,7 @@
             <p:cNvPr id="6" name="Oval 5">
               <a:extLst>
                 <a:ext uri="{FF2B5EF4-FFF2-40B4-BE49-F238E27FC236}">
-                  <a16:creationId xmlns:a16="http://schemas.microsoft.com/office/drawing/2014/main" id="{0AF1B685-5947-4FCA-8578-2E2573B50500}"/>
+                  <a16:creationId xmlns:a16="http://schemas.microsoft.com/office/drawing/2014/main" xmlns="" id="{0AF1B685-5947-4FCA-8578-2E2573B50500}"/>
                 </a:ext>
               </a:extLst>
             </p:cNvPr>
@@ -3433,7 +3433,7 @@
             <p:cNvPr id="7" name="Oval 6">
               <a:extLst>
                 <a:ext uri="{FF2B5EF4-FFF2-40B4-BE49-F238E27FC236}">
-                  <a16:creationId xmlns:a16="http://schemas.microsoft.com/office/drawing/2014/main" id="{78C829D8-8AEA-46B0-B52D-267C3E7DC429}"/>
+                  <a16:creationId xmlns:a16="http://schemas.microsoft.com/office/drawing/2014/main" xmlns="" id="{78C829D8-8AEA-46B0-B52D-267C3E7DC429}"/>
                 </a:ext>
               </a:extLst>
             </p:cNvPr>
@@ -3487,7 +3487,7 @@
             <p:cNvPr id="4" name="Rectangle 3">
               <a:extLst>
                 <a:ext uri="{FF2B5EF4-FFF2-40B4-BE49-F238E27FC236}">
-                  <a16:creationId xmlns:a16="http://schemas.microsoft.com/office/drawing/2014/main" id="{E0980DD5-50C4-4F70-81B9-C85FF23D25A0}"/>
+                  <a16:creationId xmlns:a16="http://schemas.microsoft.com/office/drawing/2014/main" xmlns="" id="{E0980DD5-50C4-4F70-81B9-C85FF23D25A0}"/>
                 </a:ext>
               </a:extLst>
             </p:cNvPr>
@@ -3544,7 +3544,7 @@
             <p:cNvPr id="9" name="Rectangle 8">
               <a:extLst>
                 <a:ext uri="{FF2B5EF4-FFF2-40B4-BE49-F238E27FC236}">
-                  <a16:creationId xmlns:a16="http://schemas.microsoft.com/office/drawing/2014/main" id="{1100EAFF-8FCD-4A65-86ED-0BB35E12F79B}"/>
+                  <a16:creationId xmlns:a16="http://schemas.microsoft.com/office/drawing/2014/main" xmlns="" id="{1100EAFF-8FCD-4A65-86ED-0BB35E12F79B}"/>
                 </a:ext>
               </a:extLst>
             </p:cNvPr>
@@ -3604,7 +3604,7 @@
             <p:cNvPr id="5" name="Rectangle: Rounded Corners 4">
               <a:extLst>
                 <a:ext uri="{FF2B5EF4-FFF2-40B4-BE49-F238E27FC236}">
-                  <a16:creationId xmlns:a16="http://schemas.microsoft.com/office/drawing/2014/main" id="{33339975-1307-4621-80CE-599D1FDB2CC6}"/>
+                  <a16:creationId xmlns:a16="http://schemas.microsoft.com/office/drawing/2014/main" xmlns="" id="{33339975-1307-4621-80CE-599D1FDB2CC6}"/>
                 </a:ext>
               </a:extLst>
             </p:cNvPr>
@@ -3664,7 +3664,7 @@
           <p:cNvPr id="18" name="Group 17">
             <a:extLst>
               <a:ext uri="{FF2B5EF4-FFF2-40B4-BE49-F238E27FC236}">
-                <a16:creationId xmlns:a16="http://schemas.microsoft.com/office/drawing/2014/main" id="{BF308BC8-91B1-4840-864B-D6FE046F3045}"/>
+                <a16:creationId xmlns:a16="http://schemas.microsoft.com/office/drawing/2014/main" xmlns="" id="{BF308BC8-91B1-4840-864B-D6FE046F3045}"/>
               </a:ext>
             </a:extLst>
           </p:cNvPr>
@@ -3684,7 +3684,7 @@
             <p:cNvPr id="12" name="Rectangle: Rounded Corners 11">
               <a:extLst>
                 <a:ext uri="{FF2B5EF4-FFF2-40B4-BE49-F238E27FC236}">
-                  <a16:creationId xmlns:a16="http://schemas.microsoft.com/office/drawing/2014/main" id="{C5845180-84DB-49CB-B0F6-026F0F03AE96}"/>
+                  <a16:creationId xmlns:a16="http://schemas.microsoft.com/office/drawing/2014/main" xmlns="" id="{C5845180-84DB-49CB-B0F6-026F0F03AE96}"/>
                 </a:ext>
               </a:extLst>
             </p:cNvPr>
@@ -3743,7 +3743,7 @@
             <p:cNvPr id="13" name="Rectangle: Rounded Corners 12">
               <a:extLst>
                 <a:ext uri="{FF2B5EF4-FFF2-40B4-BE49-F238E27FC236}">
-                  <a16:creationId xmlns:a16="http://schemas.microsoft.com/office/drawing/2014/main" id="{47DDA1CF-AEEC-4455-9B8D-E1712A4F4D07}"/>
+                  <a16:creationId xmlns:a16="http://schemas.microsoft.com/office/drawing/2014/main" xmlns="" id="{47DDA1CF-AEEC-4455-9B8D-E1712A4F4D07}"/>
                 </a:ext>
               </a:extLst>
             </p:cNvPr>
@@ -3802,7 +3802,7 @@
             <p:cNvPr id="14" name="Rectangle 13">
               <a:extLst>
                 <a:ext uri="{FF2B5EF4-FFF2-40B4-BE49-F238E27FC236}">
-                  <a16:creationId xmlns:a16="http://schemas.microsoft.com/office/drawing/2014/main" id="{C3831AE5-FC33-405D-BBC0-AC1C9DBAE6FF}"/>
+                  <a16:creationId xmlns:a16="http://schemas.microsoft.com/office/drawing/2014/main" xmlns="" id="{C3831AE5-FC33-405D-BBC0-AC1C9DBAE6FF}"/>
                 </a:ext>
               </a:extLst>
             </p:cNvPr>
@@ -3859,7 +3859,7 @@
             <p:cNvPr id="15" name="Oval 14">
               <a:extLst>
                 <a:ext uri="{FF2B5EF4-FFF2-40B4-BE49-F238E27FC236}">
-                  <a16:creationId xmlns:a16="http://schemas.microsoft.com/office/drawing/2014/main" id="{4B3618A2-8B15-4867-9E8E-B4200276EF37}"/>
+                  <a16:creationId xmlns:a16="http://schemas.microsoft.com/office/drawing/2014/main" xmlns="" id="{4B3618A2-8B15-4867-9E8E-B4200276EF37}"/>
                 </a:ext>
               </a:extLst>
             </p:cNvPr>
@@ -3913,7 +3913,7 @@
             <p:cNvPr id="16" name="Oval 15">
               <a:extLst>
                 <a:ext uri="{FF2B5EF4-FFF2-40B4-BE49-F238E27FC236}">
-                  <a16:creationId xmlns:a16="http://schemas.microsoft.com/office/drawing/2014/main" id="{2DA9BCD9-B90C-42B3-B7F5-A0685BBE0EBE}"/>
+                  <a16:creationId xmlns:a16="http://schemas.microsoft.com/office/drawing/2014/main" xmlns="" id="{2DA9BCD9-B90C-42B3-B7F5-A0685BBE0EBE}"/>
                 </a:ext>
               </a:extLst>
             </p:cNvPr>
@@ -3967,7 +3967,7 @@
             <p:cNvPr id="17" name="Rectangle 16">
               <a:extLst>
                 <a:ext uri="{FF2B5EF4-FFF2-40B4-BE49-F238E27FC236}">
-                  <a16:creationId xmlns:a16="http://schemas.microsoft.com/office/drawing/2014/main" id="{BD56E8A5-511F-4FDD-903A-9764C059A1F0}"/>
+                  <a16:creationId xmlns:a16="http://schemas.microsoft.com/office/drawing/2014/main" xmlns="" id="{BD56E8A5-511F-4FDD-903A-9764C059A1F0}"/>
                 </a:ext>
               </a:extLst>
             </p:cNvPr>
@@ -4058,7 +4058,7 @@
           <p:cNvPr id="4" name="Rectangle 3">
             <a:extLst>
               <a:ext uri="{FF2B5EF4-FFF2-40B4-BE49-F238E27FC236}">
-                <a16:creationId xmlns:a16="http://schemas.microsoft.com/office/drawing/2014/main" id="{B952EAF2-0A12-43B9-9045-FF6DF05D9554}"/>
+                <a16:creationId xmlns:a16="http://schemas.microsoft.com/office/drawing/2014/main" xmlns="" id="{B952EAF2-0A12-43B9-9045-FF6DF05D9554}"/>
               </a:ext>
             </a:extLst>
           </p:cNvPr>
@@ -4113,7 +4113,7 @@
           <p:cNvPr id="6" name="Rectangle 5">
             <a:extLst>
               <a:ext uri="{FF2B5EF4-FFF2-40B4-BE49-F238E27FC236}">
-                <a16:creationId xmlns:a16="http://schemas.microsoft.com/office/drawing/2014/main" id="{BB1785C5-707A-4CE9-BBBE-93504DA2B416}"/>
+                <a16:creationId xmlns:a16="http://schemas.microsoft.com/office/drawing/2014/main" xmlns="" id="{BB1785C5-707A-4CE9-BBBE-93504DA2B416}"/>
               </a:ext>
             </a:extLst>
           </p:cNvPr>
@@ -4165,7 +4165,7 @@
           <p:cNvPr id="8" name="Right Triangle 7">
             <a:extLst>
               <a:ext uri="{FF2B5EF4-FFF2-40B4-BE49-F238E27FC236}">
-                <a16:creationId xmlns:a16="http://schemas.microsoft.com/office/drawing/2014/main" id="{A2D6DE3E-4399-4E4A-B4D0-6B24E5925A58}"/>
+                <a16:creationId xmlns:a16="http://schemas.microsoft.com/office/drawing/2014/main" xmlns="" id="{A2D6DE3E-4399-4E4A-B4D0-6B24E5925A58}"/>
               </a:ext>
             </a:extLst>
           </p:cNvPr>
@@ -4219,7 +4219,7 @@
           <p:cNvPr id="9" name="Right Triangle 8">
             <a:extLst>
               <a:ext uri="{FF2B5EF4-FFF2-40B4-BE49-F238E27FC236}">
-                <a16:creationId xmlns:a16="http://schemas.microsoft.com/office/drawing/2014/main" id="{4492A67D-306C-40E5-A188-25C5B2E8E60E}"/>
+                <a16:creationId xmlns:a16="http://schemas.microsoft.com/office/drawing/2014/main" xmlns="" id="{4492A67D-306C-40E5-A188-25C5B2E8E60E}"/>
               </a:ext>
             </a:extLst>
           </p:cNvPr>
@@ -4271,7 +4271,7 @@
           <p:cNvPr id="10" name="Group 9">
             <a:extLst>
               <a:ext uri="{FF2B5EF4-FFF2-40B4-BE49-F238E27FC236}">
-                <a16:creationId xmlns:a16="http://schemas.microsoft.com/office/drawing/2014/main" id="{7240A447-BF0B-4888-ADEE-D2144CBECB04}"/>
+                <a16:creationId xmlns:a16="http://schemas.microsoft.com/office/drawing/2014/main" xmlns="" id="{7240A447-BF0B-4888-ADEE-D2144CBECB04}"/>
               </a:ext>
             </a:extLst>
           </p:cNvPr>
@@ -4291,7 +4291,7 @@
             <p:cNvPr id="11" name="Oval 10">
               <a:extLst>
                 <a:ext uri="{FF2B5EF4-FFF2-40B4-BE49-F238E27FC236}">
-                  <a16:creationId xmlns:a16="http://schemas.microsoft.com/office/drawing/2014/main" id="{B9E483EF-C8ED-4317-9444-C6D60D009609}"/>
+                  <a16:creationId xmlns:a16="http://schemas.microsoft.com/office/drawing/2014/main" xmlns="" id="{B9E483EF-C8ED-4317-9444-C6D60D009609}"/>
                 </a:ext>
               </a:extLst>
             </p:cNvPr>
@@ -4345,7 +4345,7 @@
             <p:cNvPr id="12" name="Oval 11">
               <a:extLst>
                 <a:ext uri="{FF2B5EF4-FFF2-40B4-BE49-F238E27FC236}">
-                  <a16:creationId xmlns:a16="http://schemas.microsoft.com/office/drawing/2014/main" id="{F5DC7E25-2E03-4DE0-8320-080C922B65CE}"/>
+                  <a16:creationId xmlns:a16="http://schemas.microsoft.com/office/drawing/2014/main" xmlns="" id="{F5DC7E25-2E03-4DE0-8320-080C922B65CE}"/>
                 </a:ext>
               </a:extLst>
             </p:cNvPr>
@@ -4399,7 +4399,7 @@
             <p:cNvPr id="13" name="Rectangle 12">
               <a:extLst>
                 <a:ext uri="{FF2B5EF4-FFF2-40B4-BE49-F238E27FC236}">
-                  <a16:creationId xmlns:a16="http://schemas.microsoft.com/office/drawing/2014/main" id="{DFA46352-C925-404B-9D8C-89CD61D2ADB4}"/>
+                  <a16:creationId xmlns:a16="http://schemas.microsoft.com/office/drawing/2014/main" xmlns="" id="{DFA46352-C925-404B-9D8C-89CD61D2ADB4}"/>
                 </a:ext>
               </a:extLst>
             </p:cNvPr>
@@ -4456,7 +4456,7 @@
             <p:cNvPr id="14" name="Rectangle: Rounded Corners 13">
               <a:extLst>
                 <a:ext uri="{FF2B5EF4-FFF2-40B4-BE49-F238E27FC236}">
-                  <a16:creationId xmlns:a16="http://schemas.microsoft.com/office/drawing/2014/main" id="{2D21F57D-E5CB-4BE7-B1D9-E4F1E8554796}"/>
+                  <a16:creationId xmlns:a16="http://schemas.microsoft.com/office/drawing/2014/main" xmlns="" id="{2D21F57D-E5CB-4BE7-B1D9-E4F1E8554796}"/>
                 </a:ext>
               </a:extLst>
             </p:cNvPr>
@@ -4516,7 +4516,7 @@
           <p:cNvPr id="16" name="Cloud 15">
             <a:extLst>
               <a:ext uri="{FF2B5EF4-FFF2-40B4-BE49-F238E27FC236}">
-                <a16:creationId xmlns:a16="http://schemas.microsoft.com/office/drawing/2014/main" id="{2CE27498-5023-4903-B058-E42EFEAA038E}"/>
+                <a16:creationId xmlns:a16="http://schemas.microsoft.com/office/drawing/2014/main" xmlns="" id="{2CE27498-5023-4903-B058-E42EFEAA038E}"/>
               </a:ext>
             </a:extLst>
           </p:cNvPr>
@@ -4573,7 +4573,7 @@
           <p:cNvPr id="5" name="Rectangle 4">
             <a:extLst>
               <a:ext uri="{FF2B5EF4-FFF2-40B4-BE49-F238E27FC236}">
-                <a16:creationId xmlns:a16="http://schemas.microsoft.com/office/drawing/2014/main" id="{54780F52-5C75-483F-A096-AE5FC390B8FA}"/>
+                <a16:creationId xmlns:a16="http://schemas.microsoft.com/office/drawing/2014/main" xmlns="" id="{54780F52-5C75-483F-A096-AE5FC390B8FA}"/>
               </a:ext>
             </a:extLst>
           </p:cNvPr>
@@ -4659,7 +4659,7 @@
           <p:cNvPr id="21" name="Rectangle 20">
             <a:extLst>
               <a:ext uri="{FF2B5EF4-FFF2-40B4-BE49-F238E27FC236}">
-                <a16:creationId xmlns:a16="http://schemas.microsoft.com/office/drawing/2014/main" id="{BD25B3EC-DB4C-4497-8FF5-572ABA1DC4C4}"/>
+                <a16:creationId xmlns:a16="http://schemas.microsoft.com/office/drawing/2014/main" xmlns="" id="{BD25B3EC-DB4C-4497-8FF5-572ABA1DC4C4}"/>
               </a:ext>
             </a:extLst>
           </p:cNvPr>
@@ -4711,7 +4711,7 @@
           <p:cNvPr id="20" name="Group 19">
             <a:extLst>
               <a:ext uri="{FF2B5EF4-FFF2-40B4-BE49-F238E27FC236}">
-                <a16:creationId xmlns:a16="http://schemas.microsoft.com/office/drawing/2014/main" id="{E9C4BE0C-8811-440A-A293-0B74E20CB15B}"/>
+                <a16:creationId xmlns:a16="http://schemas.microsoft.com/office/drawing/2014/main" xmlns="" id="{E9C4BE0C-8811-440A-A293-0B74E20CB15B}"/>
               </a:ext>
             </a:extLst>
           </p:cNvPr>
@@ -4731,7 +4731,7 @@
             <p:cNvPr id="14" name="Rectangle: Rounded Corners 13">
               <a:extLst>
                 <a:ext uri="{FF2B5EF4-FFF2-40B4-BE49-F238E27FC236}">
-                  <a16:creationId xmlns:a16="http://schemas.microsoft.com/office/drawing/2014/main" id="{F7D747E1-5321-4917-83A5-2C97927CE3D9}"/>
+                  <a16:creationId xmlns:a16="http://schemas.microsoft.com/office/drawing/2014/main" xmlns="" id="{F7D747E1-5321-4917-83A5-2C97927CE3D9}"/>
                 </a:ext>
               </a:extLst>
             </p:cNvPr>
@@ -4790,7 +4790,7 @@
             <p:cNvPr id="19" name="Rectangle: Rounded Corners 18">
               <a:extLst>
                 <a:ext uri="{FF2B5EF4-FFF2-40B4-BE49-F238E27FC236}">
-                  <a16:creationId xmlns:a16="http://schemas.microsoft.com/office/drawing/2014/main" id="{0F5F2F2C-752A-4F44-802C-BBB45CAC38B4}"/>
+                  <a16:creationId xmlns:a16="http://schemas.microsoft.com/office/drawing/2014/main" xmlns="" id="{0F5F2F2C-752A-4F44-802C-BBB45CAC38B4}"/>
                 </a:ext>
               </a:extLst>
             </p:cNvPr>
@@ -4849,7 +4849,7 @@
             <p:cNvPr id="13" name="Rectangle 12">
               <a:extLst>
                 <a:ext uri="{FF2B5EF4-FFF2-40B4-BE49-F238E27FC236}">
-                  <a16:creationId xmlns:a16="http://schemas.microsoft.com/office/drawing/2014/main" id="{F3690F3F-1F02-439A-A3F7-6E4692B1FE3F}"/>
+                  <a16:creationId xmlns:a16="http://schemas.microsoft.com/office/drawing/2014/main" xmlns="" id="{F3690F3F-1F02-439A-A3F7-6E4692B1FE3F}"/>
                 </a:ext>
               </a:extLst>
             </p:cNvPr>
@@ -4906,7 +4906,7 @@
             <p:cNvPr id="11" name="Oval 10">
               <a:extLst>
                 <a:ext uri="{FF2B5EF4-FFF2-40B4-BE49-F238E27FC236}">
-                  <a16:creationId xmlns:a16="http://schemas.microsoft.com/office/drawing/2014/main" id="{A0D0750E-85C8-46C7-A66D-0F4E01652F18}"/>
+                  <a16:creationId xmlns:a16="http://schemas.microsoft.com/office/drawing/2014/main" xmlns="" id="{A0D0750E-85C8-46C7-A66D-0F4E01652F18}"/>
                 </a:ext>
               </a:extLst>
             </p:cNvPr>
@@ -4960,7 +4960,7 @@
             <p:cNvPr id="12" name="Oval 11">
               <a:extLst>
                 <a:ext uri="{FF2B5EF4-FFF2-40B4-BE49-F238E27FC236}">
-                  <a16:creationId xmlns:a16="http://schemas.microsoft.com/office/drawing/2014/main" id="{8026C938-56CA-447F-968E-67A1FE5611D7}"/>
+                  <a16:creationId xmlns:a16="http://schemas.microsoft.com/office/drawing/2014/main" xmlns="" id="{8026C938-56CA-447F-968E-67A1FE5611D7}"/>
                 </a:ext>
               </a:extLst>
             </p:cNvPr>
@@ -5015,7 +5015,7 @@
           <p:cNvPr id="22" name="Cloud 21">
             <a:extLst>
               <a:ext uri="{FF2B5EF4-FFF2-40B4-BE49-F238E27FC236}">
-                <a16:creationId xmlns:a16="http://schemas.microsoft.com/office/drawing/2014/main" id="{7816433F-6710-4BE4-96DD-713A55E9C120}"/>
+                <a16:creationId xmlns:a16="http://schemas.microsoft.com/office/drawing/2014/main" xmlns="" id="{7816433F-6710-4BE4-96DD-713A55E9C120}"/>
               </a:ext>
             </a:extLst>
           </p:cNvPr>
@@ -5102,7 +5102,7 @@
           <p:cNvPr id="21" name="Rectangle 20">
             <a:extLst>
               <a:ext uri="{FF2B5EF4-FFF2-40B4-BE49-F238E27FC236}">
-                <a16:creationId xmlns:a16="http://schemas.microsoft.com/office/drawing/2014/main" id="{BD25B3EC-DB4C-4497-8FF5-572ABA1DC4C4}"/>
+                <a16:creationId xmlns:a16="http://schemas.microsoft.com/office/drawing/2014/main" xmlns="" id="{BD25B3EC-DB4C-4497-8FF5-572ABA1DC4C4}"/>
               </a:ext>
             </a:extLst>
           </p:cNvPr>
@@ -5154,7 +5154,7 @@
           <p:cNvPr id="20" name="Group 19">
             <a:extLst>
               <a:ext uri="{FF2B5EF4-FFF2-40B4-BE49-F238E27FC236}">
-                <a16:creationId xmlns:a16="http://schemas.microsoft.com/office/drawing/2014/main" id="{E9C4BE0C-8811-440A-A293-0B74E20CB15B}"/>
+                <a16:creationId xmlns:a16="http://schemas.microsoft.com/office/drawing/2014/main" xmlns="" id="{E9C4BE0C-8811-440A-A293-0B74E20CB15B}"/>
               </a:ext>
             </a:extLst>
           </p:cNvPr>
@@ -5174,7 +5174,7 @@
             <p:cNvPr id="14" name="Rectangle: Rounded Corners 13">
               <a:extLst>
                 <a:ext uri="{FF2B5EF4-FFF2-40B4-BE49-F238E27FC236}">
-                  <a16:creationId xmlns:a16="http://schemas.microsoft.com/office/drawing/2014/main" id="{F7D747E1-5321-4917-83A5-2C97927CE3D9}"/>
+                  <a16:creationId xmlns:a16="http://schemas.microsoft.com/office/drawing/2014/main" xmlns="" id="{F7D747E1-5321-4917-83A5-2C97927CE3D9}"/>
                 </a:ext>
               </a:extLst>
             </p:cNvPr>
@@ -5233,7 +5233,7 @@
             <p:cNvPr id="19" name="Rectangle: Rounded Corners 18">
               <a:extLst>
                 <a:ext uri="{FF2B5EF4-FFF2-40B4-BE49-F238E27FC236}">
-                  <a16:creationId xmlns:a16="http://schemas.microsoft.com/office/drawing/2014/main" id="{0F5F2F2C-752A-4F44-802C-BBB45CAC38B4}"/>
+                  <a16:creationId xmlns:a16="http://schemas.microsoft.com/office/drawing/2014/main" xmlns="" id="{0F5F2F2C-752A-4F44-802C-BBB45CAC38B4}"/>
                 </a:ext>
               </a:extLst>
             </p:cNvPr>
@@ -5292,7 +5292,7 @@
             <p:cNvPr id="13" name="Rectangle 12">
               <a:extLst>
                 <a:ext uri="{FF2B5EF4-FFF2-40B4-BE49-F238E27FC236}">
-                  <a16:creationId xmlns:a16="http://schemas.microsoft.com/office/drawing/2014/main" id="{F3690F3F-1F02-439A-A3F7-6E4692B1FE3F}"/>
+                  <a16:creationId xmlns:a16="http://schemas.microsoft.com/office/drawing/2014/main" xmlns="" id="{F3690F3F-1F02-439A-A3F7-6E4692B1FE3F}"/>
                 </a:ext>
               </a:extLst>
             </p:cNvPr>
@@ -5349,7 +5349,7 @@
             <p:cNvPr id="11" name="Oval 10">
               <a:extLst>
                 <a:ext uri="{FF2B5EF4-FFF2-40B4-BE49-F238E27FC236}">
-                  <a16:creationId xmlns:a16="http://schemas.microsoft.com/office/drawing/2014/main" id="{A0D0750E-85C8-46C7-A66D-0F4E01652F18}"/>
+                  <a16:creationId xmlns:a16="http://schemas.microsoft.com/office/drawing/2014/main" xmlns="" id="{A0D0750E-85C8-46C7-A66D-0F4E01652F18}"/>
                 </a:ext>
               </a:extLst>
             </p:cNvPr>
@@ -5403,7 +5403,7 @@
             <p:cNvPr id="12" name="Oval 11">
               <a:extLst>
                 <a:ext uri="{FF2B5EF4-FFF2-40B4-BE49-F238E27FC236}">
-                  <a16:creationId xmlns:a16="http://schemas.microsoft.com/office/drawing/2014/main" id="{8026C938-56CA-447F-968E-67A1FE5611D7}"/>
+                  <a16:creationId xmlns:a16="http://schemas.microsoft.com/office/drawing/2014/main" xmlns="" id="{8026C938-56CA-447F-968E-67A1FE5611D7}"/>
                 </a:ext>
               </a:extLst>
             </p:cNvPr>
@@ -5458,7 +5458,7 @@
           <p:cNvPr id="22" name="Cloud 21">
             <a:extLst>
               <a:ext uri="{FF2B5EF4-FFF2-40B4-BE49-F238E27FC236}">
-                <a16:creationId xmlns:a16="http://schemas.microsoft.com/office/drawing/2014/main" id="{7816433F-6710-4BE4-96DD-713A55E9C120}"/>
+                <a16:creationId xmlns:a16="http://schemas.microsoft.com/office/drawing/2014/main" xmlns="" id="{7816433F-6710-4BE4-96DD-713A55E9C120}"/>
               </a:ext>
             </a:extLst>
           </p:cNvPr>
@@ -5515,7 +5515,7 @@
           <p:cNvPr id="18" name="Rectangle 17">
             <a:extLst>
               <a:ext uri="{FF2B5EF4-FFF2-40B4-BE49-F238E27FC236}">
-                <a16:creationId xmlns:a16="http://schemas.microsoft.com/office/drawing/2014/main" id="{1691F04F-5542-4138-AE32-C7ABDADEDD48}"/>
+                <a16:creationId xmlns:a16="http://schemas.microsoft.com/office/drawing/2014/main" xmlns="" id="{1691F04F-5542-4138-AE32-C7ABDADEDD48}"/>
               </a:ext>
             </a:extLst>
           </p:cNvPr>
@@ -5569,7 +5569,7 @@
           <p:cNvPr id="23" name="Oval 22">
             <a:extLst>
               <a:ext uri="{FF2B5EF4-FFF2-40B4-BE49-F238E27FC236}">
-                <a16:creationId xmlns:a16="http://schemas.microsoft.com/office/drawing/2014/main" id="{68F7C2D4-7A61-481E-95A2-C3E0FF07CEB2}"/>
+                <a16:creationId xmlns:a16="http://schemas.microsoft.com/office/drawing/2014/main" xmlns="" id="{68F7C2D4-7A61-481E-95A2-C3E0FF07CEB2}"/>
               </a:ext>
             </a:extLst>
           </p:cNvPr>
@@ -5623,7 +5623,7 @@
           <p:cNvPr id="24" name="Oval 23">
             <a:extLst>
               <a:ext uri="{FF2B5EF4-FFF2-40B4-BE49-F238E27FC236}">
-                <a16:creationId xmlns:a16="http://schemas.microsoft.com/office/drawing/2014/main" id="{39986F21-83F4-47B4-A190-C21573817676}"/>
+                <a16:creationId xmlns:a16="http://schemas.microsoft.com/office/drawing/2014/main" xmlns="" id="{39986F21-83F4-47B4-A190-C21573817676}"/>
               </a:ext>
             </a:extLst>
           </p:cNvPr>
@@ -5677,7 +5677,7 @@
           <p:cNvPr id="25" name="Oval 24">
             <a:extLst>
               <a:ext uri="{FF2B5EF4-FFF2-40B4-BE49-F238E27FC236}">
-                <a16:creationId xmlns:a16="http://schemas.microsoft.com/office/drawing/2014/main" id="{304F4A48-1083-4DC0-BBEA-AD2CB3155009}"/>
+                <a16:creationId xmlns:a16="http://schemas.microsoft.com/office/drawing/2014/main" xmlns="" id="{304F4A48-1083-4DC0-BBEA-AD2CB3155009}"/>
               </a:ext>
             </a:extLst>
           </p:cNvPr>
@@ -5761,7 +5761,7 @@
           <p:cNvPr id="21" name="Rectangle 20">
             <a:extLst>
               <a:ext uri="{FF2B5EF4-FFF2-40B4-BE49-F238E27FC236}">
-                <a16:creationId xmlns:a16="http://schemas.microsoft.com/office/drawing/2014/main" id="{BD25B3EC-DB4C-4497-8FF5-572ABA1DC4C4}"/>
+                <a16:creationId xmlns:a16="http://schemas.microsoft.com/office/drawing/2014/main" xmlns="" id="{BD25B3EC-DB4C-4497-8FF5-572ABA1DC4C4}"/>
               </a:ext>
             </a:extLst>
           </p:cNvPr>
@@ -5813,7 +5813,7 @@
           <p:cNvPr id="20" name="Group 19">
             <a:extLst>
               <a:ext uri="{FF2B5EF4-FFF2-40B4-BE49-F238E27FC236}">
-                <a16:creationId xmlns:a16="http://schemas.microsoft.com/office/drawing/2014/main" id="{E9C4BE0C-8811-440A-A293-0B74E20CB15B}"/>
+                <a16:creationId xmlns:a16="http://schemas.microsoft.com/office/drawing/2014/main" xmlns="" id="{E9C4BE0C-8811-440A-A293-0B74E20CB15B}"/>
               </a:ext>
             </a:extLst>
           </p:cNvPr>
@@ -5833,7 +5833,7 @@
             <p:cNvPr id="14" name="Rectangle: Rounded Corners 13">
               <a:extLst>
                 <a:ext uri="{FF2B5EF4-FFF2-40B4-BE49-F238E27FC236}">
-                  <a16:creationId xmlns:a16="http://schemas.microsoft.com/office/drawing/2014/main" id="{F7D747E1-5321-4917-83A5-2C97927CE3D9}"/>
+                  <a16:creationId xmlns:a16="http://schemas.microsoft.com/office/drawing/2014/main" xmlns="" id="{F7D747E1-5321-4917-83A5-2C97927CE3D9}"/>
                 </a:ext>
               </a:extLst>
             </p:cNvPr>
@@ -5892,7 +5892,7 @@
             <p:cNvPr id="19" name="Rectangle: Rounded Corners 18">
               <a:extLst>
                 <a:ext uri="{FF2B5EF4-FFF2-40B4-BE49-F238E27FC236}">
-                  <a16:creationId xmlns:a16="http://schemas.microsoft.com/office/drawing/2014/main" id="{0F5F2F2C-752A-4F44-802C-BBB45CAC38B4}"/>
+                  <a16:creationId xmlns:a16="http://schemas.microsoft.com/office/drawing/2014/main" xmlns="" id="{0F5F2F2C-752A-4F44-802C-BBB45CAC38B4}"/>
                 </a:ext>
               </a:extLst>
             </p:cNvPr>
@@ -5951,7 +5951,7 @@
             <p:cNvPr id="13" name="Rectangle 12">
               <a:extLst>
                 <a:ext uri="{FF2B5EF4-FFF2-40B4-BE49-F238E27FC236}">
-                  <a16:creationId xmlns:a16="http://schemas.microsoft.com/office/drawing/2014/main" id="{F3690F3F-1F02-439A-A3F7-6E4692B1FE3F}"/>
+                  <a16:creationId xmlns:a16="http://schemas.microsoft.com/office/drawing/2014/main" xmlns="" id="{F3690F3F-1F02-439A-A3F7-6E4692B1FE3F}"/>
                 </a:ext>
               </a:extLst>
             </p:cNvPr>
@@ -6008,7 +6008,7 @@
             <p:cNvPr id="11" name="Oval 10">
               <a:extLst>
                 <a:ext uri="{FF2B5EF4-FFF2-40B4-BE49-F238E27FC236}">
-                  <a16:creationId xmlns:a16="http://schemas.microsoft.com/office/drawing/2014/main" id="{A0D0750E-85C8-46C7-A66D-0F4E01652F18}"/>
+                  <a16:creationId xmlns:a16="http://schemas.microsoft.com/office/drawing/2014/main" xmlns="" id="{A0D0750E-85C8-46C7-A66D-0F4E01652F18}"/>
                 </a:ext>
               </a:extLst>
             </p:cNvPr>
@@ -6062,7 +6062,7 @@
             <p:cNvPr id="12" name="Oval 11">
               <a:extLst>
                 <a:ext uri="{FF2B5EF4-FFF2-40B4-BE49-F238E27FC236}">
-                  <a16:creationId xmlns:a16="http://schemas.microsoft.com/office/drawing/2014/main" id="{8026C938-56CA-447F-968E-67A1FE5611D7}"/>
+                  <a16:creationId xmlns:a16="http://schemas.microsoft.com/office/drawing/2014/main" xmlns="" id="{8026C938-56CA-447F-968E-67A1FE5611D7}"/>
                 </a:ext>
               </a:extLst>
             </p:cNvPr>
@@ -6117,7 +6117,7 @@
           <p:cNvPr id="22" name="Cloud 21">
             <a:extLst>
               <a:ext uri="{FF2B5EF4-FFF2-40B4-BE49-F238E27FC236}">
-                <a16:creationId xmlns:a16="http://schemas.microsoft.com/office/drawing/2014/main" id="{7816433F-6710-4BE4-96DD-713A55E9C120}"/>
+                <a16:creationId xmlns:a16="http://schemas.microsoft.com/office/drawing/2014/main" xmlns="" id="{7816433F-6710-4BE4-96DD-713A55E9C120}"/>
               </a:ext>
             </a:extLst>
           </p:cNvPr>
@@ -6174,7 +6174,7 @@
           <p:cNvPr id="18" name="Rectangle 17">
             <a:extLst>
               <a:ext uri="{FF2B5EF4-FFF2-40B4-BE49-F238E27FC236}">
-                <a16:creationId xmlns:a16="http://schemas.microsoft.com/office/drawing/2014/main" id="{1691F04F-5542-4138-AE32-C7ABDADEDD48}"/>
+                <a16:creationId xmlns:a16="http://schemas.microsoft.com/office/drawing/2014/main" xmlns="" id="{1691F04F-5542-4138-AE32-C7ABDADEDD48}"/>
               </a:ext>
             </a:extLst>
           </p:cNvPr>
@@ -6228,7 +6228,7 @@
           <p:cNvPr id="24" name="Oval 23">
             <a:extLst>
               <a:ext uri="{FF2B5EF4-FFF2-40B4-BE49-F238E27FC236}">
-                <a16:creationId xmlns:a16="http://schemas.microsoft.com/office/drawing/2014/main" id="{39986F21-83F4-47B4-A190-C21573817676}"/>
+                <a16:creationId xmlns:a16="http://schemas.microsoft.com/office/drawing/2014/main" xmlns="" id="{39986F21-83F4-47B4-A190-C21573817676}"/>
               </a:ext>
             </a:extLst>
           </p:cNvPr>
@@ -6282,7 +6282,7 @@
           <p:cNvPr id="3" name="Straight Connector 2">
             <a:extLst>
               <a:ext uri="{FF2B5EF4-FFF2-40B4-BE49-F238E27FC236}">
-                <a16:creationId xmlns:a16="http://schemas.microsoft.com/office/drawing/2014/main" id="{D4FE5C44-DB15-43D7-861A-9E8E750611FA}"/>
+                <a16:creationId xmlns:a16="http://schemas.microsoft.com/office/drawing/2014/main" xmlns="" id="{D4FE5C44-DB15-43D7-861A-9E8E750611FA}"/>
               </a:ext>
             </a:extLst>
           </p:cNvPr>
@@ -6325,7 +6325,7 @@
           <p:cNvPr id="23" name="Oval 22">
             <a:extLst>
               <a:ext uri="{FF2B5EF4-FFF2-40B4-BE49-F238E27FC236}">
-                <a16:creationId xmlns:a16="http://schemas.microsoft.com/office/drawing/2014/main" id="{68F7C2D4-7A61-481E-95A2-C3E0FF07CEB2}"/>
+                <a16:creationId xmlns:a16="http://schemas.microsoft.com/office/drawing/2014/main" xmlns="" id="{68F7C2D4-7A61-481E-95A2-C3E0FF07CEB2}"/>
               </a:ext>
             </a:extLst>
           </p:cNvPr>
@@ -6379,7 +6379,7 @@
           <p:cNvPr id="25" name="Oval 24">
             <a:extLst>
               <a:ext uri="{FF2B5EF4-FFF2-40B4-BE49-F238E27FC236}">
-                <a16:creationId xmlns:a16="http://schemas.microsoft.com/office/drawing/2014/main" id="{304F4A48-1083-4DC0-BBEA-AD2CB3155009}"/>
+                <a16:creationId xmlns:a16="http://schemas.microsoft.com/office/drawing/2014/main" xmlns="" id="{304F4A48-1083-4DC0-BBEA-AD2CB3155009}"/>
               </a:ext>
             </a:extLst>
           </p:cNvPr>
@@ -6433,7 +6433,7 @@
           <p:cNvPr id="5" name="Straight Connector 4">
             <a:extLst>
               <a:ext uri="{FF2B5EF4-FFF2-40B4-BE49-F238E27FC236}">
-                <a16:creationId xmlns:a16="http://schemas.microsoft.com/office/drawing/2014/main" id="{86723112-7FE1-441F-9F8A-F889DE6EF386}"/>
+                <a16:creationId xmlns:a16="http://schemas.microsoft.com/office/drawing/2014/main" xmlns="" id="{86723112-7FE1-441F-9F8A-F889DE6EF386}"/>
               </a:ext>
             </a:extLst>
           </p:cNvPr>
@@ -6476,7 +6476,7 @@
           <p:cNvPr id="8" name="Arrow: Right 7">
             <a:extLst>
               <a:ext uri="{FF2B5EF4-FFF2-40B4-BE49-F238E27FC236}">
-                <a16:creationId xmlns:a16="http://schemas.microsoft.com/office/drawing/2014/main" id="{902D70E0-C0D5-495D-81FF-8718930F7553}"/>
+                <a16:creationId xmlns:a16="http://schemas.microsoft.com/office/drawing/2014/main" xmlns="" id="{902D70E0-C0D5-495D-81FF-8718930F7553}"/>
               </a:ext>
             </a:extLst>
           </p:cNvPr>
@@ -6561,7 +6561,7 @@
           <p:cNvPr id="21" name="Rectangle 20">
             <a:extLst>
               <a:ext uri="{FF2B5EF4-FFF2-40B4-BE49-F238E27FC236}">
-                <a16:creationId xmlns:a16="http://schemas.microsoft.com/office/drawing/2014/main" id="{BD25B3EC-DB4C-4497-8FF5-572ABA1DC4C4}"/>
+                <a16:creationId xmlns:a16="http://schemas.microsoft.com/office/drawing/2014/main" xmlns="" id="{BD25B3EC-DB4C-4497-8FF5-572ABA1DC4C4}"/>
               </a:ext>
             </a:extLst>
           </p:cNvPr>
@@ -6613,7 +6613,7 @@
           <p:cNvPr id="22" name="Cloud 21">
             <a:extLst>
               <a:ext uri="{FF2B5EF4-FFF2-40B4-BE49-F238E27FC236}">
-                <a16:creationId xmlns:a16="http://schemas.microsoft.com/office/drawing/2014/main" id="{7816433F-6710-4BE4-96DD-713A55E9C120}"/>
+                <a16:creationId xmlns:a16="http://schemas.microsoft.com/office/drawing/2014/main" xmlns="" id="{7816433F-6710-4BE4-96DD-713A55E9C120}"/>
               </a:ext>
             </a:extLst>
           </p:cNvPr>
@@ -6670,7 +6670,7 @@
           <p:cNvPr id="36" name="Group 35">
             <a:extLst>
               <a:ext uri="{FF2B5EF4-FFF2-40B4-BE49-F238E27FC236}">
-                <a16:creationId xmlns:a16="http://schemas.microsoft.com/office/drawing/2014/main" id="{9D3C3581-799D-41C4-8A7E-3B1F29D7F724}"/>
+                <a16:creationId xmlns:a16="http://schemas.microsoft.com/office/drawing/2014/main" xmlns="" id="{9D3C3581-799D-41C4-8A7E-3B1F29D7F724}"/>
               </a:ext>
             </a:extLst>
           </p:cNvPr>
@@ -6690,7 +6690,7 @@
             <p:cNvPr id="40" name="Rectangle: Rounded Corners 39">
               <a:extLst>
                 <a:ext uri="{FF2B5EF4-FFF2-40B4-BE49-F238E27FC236}">
-                  <a16:creationId xmlns:a16="http://schemas.microsoft.com/office/drawing/2014/main" id="{342ABA70-F860-492B-BFBC-F4814929B690}"/>
+                  <a16:creationId xmlns:a16="http://schemas.microsoft.com/office/drawing/2014/main" xmlns="" id="{342ABA70-F860-492B-BFBC-F4814929B690}"/>
                 </a:ext>
               </a:extLst>
             </p:cNvPr>
@@ -6749,7 +6749,7 @@
             <p:cNvPr id="41" name="Rectangle: Rounded Corners 40">
               <a:extLst>
                 <a:ext uri="{FF2B5EF4-FFF2-40B4-BE49-F238E27FC236}">
-                  <a16:creationId xmlns:a16="http://schemas.microsoft.com/office/drawing/2014/main" id="{7C3DC209-DCFF-49CD-B4CD-A701A6076BC1}"/>
+                  <a16:creationId xmlns:a16="http://schemas.microsoft.com/office/drawing/2014/main" xmlns="" id="{7C3DC209-DCFF-49CD-B4CD-A701A6076BC1}"/>
                 </a:ext>
               </a:extLst>
             </p:cNvPr>
@@ -6808,7 +6808,7 @@
             <p:cNvPr id="42" name="Rectangle 41">
               <a:extLst>
                 <a:ext uri="{FF2B5EF4-FFF2-40B4-BE49-F238E27FC236}">
-                  <a16:creationId xmlns:a16="http://schemas.microsoft.com/office/drawing/2014/main" id="{0D2D6DD8-D866-4F3D-967E-38D0B5925AD4}"/>
+                  <a16:creationId xmlns:a16="http://schemas.microsoft.com/office/drawing/2014/main" xmlns="" id="{0D2D6DD8-D866-4F3D-967E-38D0B5925AD4}"/>
                 </a:ext>
               </a:extLst>
             </p:cNvPr>
@@ -6865,7 +6865,7 @@
             <p:cNvPr id="43" name="Oval 42">
               <a:extLst>
                 <a:ext uri="{FF2B5EF4-FFF2-40B4-BE49-F238E27FC236}">
-                  <a16:creationId xmlns:a16="http://schemas.microsoft.com/office/drawing/2014/main" id="{68D34BEC-9182-437E-9BA8-AD7FFA4B19EB}"/>
+                  <a16:creationId xmlns:a16="http://schemas.microsoft.com/office/drawing/2014/main" xmlns="" id="{68D34BEC-9182-437E-9BA8-AD7FFA4B19EB}"/>
                 </a:ext>
               </a:extLst>
             </p:cNvPr>
@@ -6919,7 +6919,7 @@
             <p:cNvPr id="44" name="Oval 43">
               <a:extLst>
                 <a:ext uri="{FF2B5EF4-FFF2-40B4-BE49-F238E27FC236}">
-                  <a16:creationId xmlns:a16="http://schemas.microsoft.com/office/drawing/2014/main" id="{BFE920F1-16B1-473C-990F-979542E37EF6}"/>
+                  <a16:creationId xmlns:a16="http://schemas.microsoft.com/office/drawing/2014/main" xmlns="" id="{BFE920F1-16B1-473C-990F-979542E37EF6}"/>
                 </a:ext>
               </a:extLst>
             </p:cNvPr>
@@ -6974,7 +6974,7 @@
           <p:cNvPr id="18" name="Rectangle 17">
             <a:extLst>
               <a:ext uri="{FF2B5EF4-FFF2-40B4-BE49-F238E27FC236}">
-                <a16:creationId xmlns:a16="http://schemas.microsoft.com/office/drawing/2014/main" id="{1691F04F-5542-4138-AE32-C7ABDADEDD48}"/>
+                <a16:creationId xmlns:a16="http://schemas.microsoft.com/office/drawing/2014/main" xmlns="" id="{1691F04F-5542-4138-AE32-C7ABDADEDD48}"/>
               </a:ext>
             </a:extLst>
           </p:cNvPr>
@@ -7028,7 +7028,7 @@
           <p:cNvPr id="3" name="Straight Connector 2">
             <a:extLst>
               <a:ext uri="{FF2B5EF4-FFF2-40B4-BE49-F238E27FC236}">
-                <a16:creationId xmlns:a16="http://schemas.microsoft.com/office/drawing/2014/main" id="{D4FE5C44-DB15-43D7-861A-9E8E750611FA}"/>
+                <a16:creationId xmlns:a16="http://schemas.microsoft.com/office/drawing/2014/main" xmlns="" id="{D4FE5C44-DB15-43D7-861A-9E8E750611FA}"/>
               </a:ext>
             </a:extLst>
           </p:cNvPr>
@@ -7071,7 +7071,7 @@
           <p:cNvPr id="23" name="Oval 22">
             <a:extLst>
               <a:ext uri="{FF2B5EF4-FFF2-40B4-BE49-F238E27FC236}">
-                <a16:creationId xmlns:a16="http://schemas.microsoft.com/office/drawing/2014/main" id="{68F7C2D4-7A61-481E-95A2-C3E0FF07CEB2}"/>
+                <a16:creationId xmlns:a16="http://schemas.microsoft.com/office/drawing/2014/main" xmlns="" id="{68F7C2D4-7A61-481E-95A2-C3E0FF07CEB2}"/>
               </a:ext>
             </a:extLst>
           </p:cNvPr>
@@ -7125,7 +7125,7 @@
           <p:cNvPr id="37" name="Oval 36">
             <a:extLst>
               <a:ext uri="{FF2B5EF4-FFF2-40B4-BE49-F238E27FC236}">
-                <a16:creationId xmlns:a16="http://schemas.microsoft.com/office/drawing/2014/main" id="{9370E720-6E28-4D6C-BB02-7682277CAE3D}"/>
+                <a16:creationId xmlns:a16="http://schemas.microsoft.com/office/drawing/2014/main" xmlns="" id="{9370E720-6E28-4D6C-BB02-7682277CAE3D}"/>
               </a:ext>
             </a:extLst>
           </p:cNvPr>
@@ -7179,7 +7179,7 @@
           <p:cNvPr id="38" name="Oval 37">
             <a:extLst>
               <a:ext uri="{FF2B5EF4-FFF2-40B4-BE49-F238E27FC236}">
-                <a16:creationId xmlns:a16="http://schemas.microsoft.com/office/drawing/2014/main" id="{E1568EDB-529F-481E-9BD9-1A4190F5A051}"/>
+                <a16:creationId xmlns:a16="http://schemas.microsoft.com/office/drawing/2014/main" xmlns="" id="{E1568EDB-529F-481E-9BD9-1A4190F5A051}"/>
               </a:ext>
             </a:extLst>
           </p:cNvPr>
@@ -7263,7 +7263,7 @@
           <p:cNvPr id="21" name="Rectangle 20">
             <a:extLst>
               <a:ext uri="{FF2B5EF4-FFF2-40B4-BE49-F238E27FC236}">
-                <a16:creationId xmlns:a16="http://schemas.microsoft.com/office/drawing/2014/main" id="{BD25B3EC-DB4C-4497-8FF5-572ABA1DC4C4}"/>
+                <a16:creationId xmlns:a16="http://schemas.microsoft.com/office/drawing/2014/main" xmlns="" id="{BD25B3EC-DB4C-4497-8FF5-572ABA1DC4C4}"/>
               </a:ext>
             </a:extLst>
           </p:cNvPr>
@@ -7315,7 +7315,7 @@
           <p:cNvPr id="26" name="Straight Connector 25">
             <a:extLst>
               <a:ext uri="{FF2B5EF4-FFF2-40B4-BE49-F238E27FC236}">
-                <a16:creationId xmlns:a16="http://schemas.microsoft.com/office/drawing/2014/main" id="{8F6E0289-E345-4A0E-9753-7FC8FE3E078D}"/>
+                <a16:creationId xmlns:a16="http://schemas.microsoft.com/office/drawing/2014/main" xmlns="" id="{8F6E0289-E345-4A0E-9753-7FC8FE3E078D}"/>
               </a:ext>
             </a:extLst>
           </p:cNvPr>
@@ -7360,7 +7360,7 @@
           <p:cNvPr id="27" name="Straight Connector 26">
             <a:extLst>
               <a:ext uri="{FF2B5EF4-FFF2-40B4-BE49-F238E27FC236}">
-                <a16:creationId xmlns:a16="http://schemas.microsoft.com/office/drawing/2014/main" id="{0F420222-C32D-4282-B4C1-8EE001FE4EB1}"/>
+                <a16:creationId xmlns:a16="http://schemas.microsoft.com/office/drawing/2014/main" xmlns="" id="{0F420222-C32D-4282-B4C1-8EE001FE4EB1}"/>
               </a:ext>
             </a:extLst>
           </p:cNvPr>
@@ -7405,7 +7405,7 @@
           <p:cNvPr id="22" name="Cloud 21">
             <a:extLst>
               <a:ext uri="{FF2B5EF4-FFF2-40B4-BE49-F238E27FC236}">
-                <a16:creationId xmlns:a16="http://schemas.microsoft.com/office/drawing/2014/main" id="{7816433F-6710-4BE4-96DD-713A55E9C120}"/>
+                <a16:creationId xmlns:a16="http://schemas.microsoft.com/office/drawing/2014/main" xmlns="" id="{7816433F-6710-4BE4-96DD-713A55E9C120}"/>
               </a:ext>
             </a:extLst>
           </p:cNvPr>
@@ -7462,7 +7462,7 @@
           <p:cNvPr id="36" name="Group 35">
             <a:extLst>
               <a:ext uri="{FF2B5EF4-FFF2-40B4-BE49-F238E27FC236}">
-                <a16:creationId xmlns:a16="http://schemas.microsoft.com/office/drawing/2014/main" id="{9D3C3581-799D-41C4-8A7E-3B1F29D7F724}"/>
+                <a16:creationId xmlns:a16="http://schemas.microsoft.com/office/drawing/2014/main" xmlns="" id="{9D3C3581-799D-41C4-8A7E-3B1F29D7F724}"/>
               </a:ext>
             </a:extLst>
           </p:cNvPr>
@@ -7487,7 +7487,7 @@
             <p:cNvPr id="40" name="Rectangle: Rounded Corners 39">
               <a:extLst>
                 <a:ext uri="{FF2B5EF4-FFF2-40B4-BE49-F238E27FC236}">
-                  <a16:creationId xmlns:a16="http://schemas.microsoft.com/office/drawing/2014/main" id="{342ABA70-F860-492B-BFBC-F4814929B690}"/>
+                  <a16:creationId xmlns:a16="http://schemas.microsoft.com/office/drawing/2014/main" xmlns="" id="{342ABA70-F860-492B-BFBC-F4814929B690}"/>
                 </a:ext>
               </a:extLst>
             </p:cNvPr>
@@ -7541,7 +7541,7 @@
             <p:cNvPr id="41" name="Rectangle: Rounded Corners 40">
               <a:extLst>
                 <a:ext uri="{FF2B5EF4-FFF2-40B4-BE49-F238E27FC236}">
-                  <a16:creationId xmlns:a16="http://schemas.microsoft.com/office/drawing/2014/main" id="{7C3DC209-DCFF-49CD-B4CD-A701A6076BC1}"/>
+                  <a16:creationId xmlns:a16="http://schemas.microsoft.com/office/drawing/2014/main" xmlns="" id="{7C3DC209-DCFF-49CD-B4CD-A701A6076BC1}"/>
                 </a:ext>
               </a:extLst>
             </p:cNvPr>
@@ -7595,7 +7595,7 @@
             <p:cNvPr id="42" name="Rectangle 41">
               <a:extLst>
                 <a:ext uri="{FF2B5EF4-FFF2-40B4-BE49-F238E27FC236}">
-                  <a16:creationId xmlns:a16="http://schemas.microsoft.com/office/drawing/2014/main" id="{0D2D6DD8-D866-4F3D-967E-38D0B5925AD4}"/>
+                  <a16:creationId xmlns:a16="http://schemas.microsoft.com/office/drawing/2014/main" xmlns="" id="{0D2D6DD8-D866-4F3D-967E-38D0B5925AD4}"/>
                 </a:ext>
               </a:extLst>
             </p:cNvPr>
@@ -7647,7 +7647,7 @@
             <p:cNvPr id="43" name="Oval 42">
               <a:extLst>
                 <a:ext uri="{FF2B5EF4-FFF2-40B4-BE49-F238E27FC236}">
-                  <a16:creationId xmlns:a16="http://schemas.microsoft.com/office/drawing/2014/main" id="{68D34BEC-9182-437E-9BA8-AD7FFA4B19EB}"/>
+                  <a16:creationId xmlns:a16="http://schemas.microsoft.com/office/drawing/2014/main" xmlns="" id="{68D34BEC-9182-437E-9BA8-AD7FFA4B19EB}"/>
                 </a:ext>
               </a:extLst>
             </p:cNvPr>
@@ -7699,7 +7699,7 @@
             <p:cNvPr id="44" name="Oval 43">
               <a:extLst>
                 <a:ext uri="{FF2B5EF4-FFF2-40B4-BE49-F238E27FC236}">
-                  <a16:creationId xmlns:a16="http://schemas.microsoft.com/office/drawing/2014/main" id="{BFE920F1-16B1-473C-990F-979542E37EF6}"/>
+                  <a16:creationId xmlns:a16="http://schemas.microsoft.com/office/drawing/2014/main" xmlns="" id="{BFE920F1-16B1-473C-990F-979542E37EF6}"/>
                 </a:ext>
               </a:extLst>
             </p:cNvPr>
@@ -7752,7 +7752,7 @@
           <p:cNvPr id="15" name="Group 14">
             <a:extLst>
               <a:ext uri="{FF2B5EF4-FFF2-40B4-BE49-F238E27FC236}">
-                <a16:creationId xmlns:a16="http://schemas.microsoft.com/office/drawing/2014/main" id="{0EB7F6F5-EE0C-4A6A-91A8-4227CAAA66AD}"/>
+                <a16:creationId xmlns:a16="http://schemas.microsoft.com/office/drawing/2014/main" xmlns="" id="{0EB7F6F5-EE0C-4A6A-91A8-4227CAAA66AD}"/>
               </a:ext>
             </a:extLst>
           </p:cNvPr>
@@ -7772,7 +7772,7 @@
             <p:cNvPr id="16" name="Rectangle: Rounded Corners 15">
               <a:extLst>
                 <a:ext uri="{FF2B5EF4-FFF2-40B4-BE49-F238E27FC236}">
-                  <a16:creationId xmlns:a16="http://schemas.microsoft.com/office/drawing/2014/main" id="{4910E712-7CCC-4036-BB7D-5C63E9E5FDAB}"/>
+                  <a16:creationId xmlns:a16="http://schemas.microsoft.com/office/drawing/2014/main" xmlns="" id="{4910E712-7CCC-4036-BB7D-5C63E9E5FDAB}"/>
                 </a:ext>
               </a:extLst>
             </p:cNvPr>
@@ -7831,7 +7831,7 @@
             <p:cNvPr id="17" name="Rectangle: Rounded Corners 16">
               <a:extLst>
                 <a:ext uri="{FF2B5EF4-FFF2-40B4-BE49-F238E27FC236}">
-                  <a16:creationId xmlns:a16="http://schemas.microsoft.com/office/drawing/2014/main" id="{203D6D70-B921-4172-8BB5-E3E2F3045288}"/>
+                  <a16:creationId xmlns:a16="http://schemas.microsoft.com/office/drawing/2014/main" xmlns="" id="{203D6D70-B921-4172-8BB5-E3E2F3045288}"/>
                 </a:ext>
               </a:extLst>
             </p:cNvPr>
@@ -7890,7 +7890,7 @@
             <p:cNvPr id="19" name="Rectangle 18">
               <a:extLst>
                 <a:ext uri="{FF2B5EF4-FFF2-40B4-BE49-F238E27FC236}">
-                  <a16:creationId xmlns:a16="http://schemas.microsoft.com/office/drawing/2014/main" id="{8F9E3AED-DA06-41E3-B4CB-F98B313D387C}"/>
+                  <a16:creationId xmlns:a16="http://schemas.microsoft.com/office/drawing/2014/main" xmlns="" id="{8F9E3AED-DA06-41E3-B4CB-F98B313D387C}"/>
                 </a:ext>
               </a:extLst>
             </p:cNvPr>
@@ -7947,7 +7947,7 @@
             <p:cNvPr id="20" name="Oval 19">
               <a:extLst>
                 <a:ext uri="{FF2B5EF4-FFF2-40B4-BE49-F238E27FC236}">
-                  <a16:creationId xmlns:a16="http://schemas.microsoft.com/office/drawing/2014/main" id="{AE61BD7C-6DB3-4503-ACFA-F76BE066663D}"/>
+                  <a16:creationId xmlns:a16="http://schemas.microsoft.com/office/drawing/2014/main" xmlns="" id="{AE61BD7C-6DB3-4503-ACFA-F76BE066663D}"/>
                 </a:ext>
               </a:extLst>
             </p:cNvPr>
@@ -8001,7 +8001,7 @@
             <p:cNvPr id="24" name="Oval 23">
               <a:extLst>
                 <a:ext uri="{FF2B5EF4-FFF2-40B4-BE49-F238E27FC236}">
-                  <a16:creationId xmlns:a16="http://schemas.microsoft.com/office/drawing/2014/main" id="{077293C1-F0DE-421A-9D7C-E6AFAB90A861}"/>
+                  <a16:creationId xmlns:a16="http://schemas.microsoft.com/office/drawing/2014/main" xmlns="" id="{077293C1-F0DE-421A-9D7C-E6AFAB90A861}"/>
                 </a:ext>
               </a:extLst>
             </p:cNvPr>
@@ -8086,7 +8086,7 @@
           <p:cNvPr id="45" name="Flowchart: Manual Input 44">
             <a:extLst>
               <a:ext uri="{FF2B5EF4-FFF2-40B4-BE49-F238E27FC236}">
-                <a16:creationId xmlns:a16="http://schemas.microsoft.com/office/drawing/2014/main" id="{BA5F8287-28B2-4933-91CE-CCF8DA7FDCDF}"/>
+                <a16:creationId xmlns:a16="http://schemas.microsoft.com/office/drawing/2014/main" xmlns="" id="{BA5F8287-28B2-4933-91CE-CCF8DA7FDCDF}"/>
               </a:ext>
             </a:extLst>
           </p:cNvPr>
@@ -8138,7 +8138,7 @@
           <p:cNvPr id="4" name="Right Triangle 3">
             <a:extLst>
               <a:ext uri="{FF2B5EF4-FFF2-40B4-BE49-F238E27FC236}">
-                <a16:creationId xmlns:a16="http://schemas.microsoft.com/office/drawing/2014/main" id="{464F1B2E-5DF7-46D5-BDFC-472B9191165F}"/>
+                <a16:creationId xmlns:a16="http://schemas.microsoft.com/office/drawing/2014/main" xmlns="" id="{464F1B2E-5DF7-46D5-BDFC-472B9191165F}"/>
               </a:ext>
             </a:extLst>
           </p:cNvPr>
@@ -8190,7 +8190,7 @@
           <p:cNvPr id="5" name="TextBox 4">
             <a:extLst>
               <a:ext uri="{FF2B5EF4-FFF2-40B4-BE49-F238E27FC236}">
-                <a16:creationId xmlns:a16="http://schemas.microsoft.com/office/drawing/2014/main" id="{C9845309-04CD-46F6-826C-E8307EB2CC9D}"/>
+                <a16:creationId xmlns:a16="http://schemas.microsoft.com/office/drawing/2014/main" xmlns="" id="{C9845309-04CD-46F6-826C-E8307EB2CC9D}"/>
               </a:ext>
             </a:extLst>
           </p:cNvPr>
@@ -8237,7 +8237,7 @@
           <p:cNvPr id="11" name="Straight Arrow Connector 10">
             <a:extLst>
               <a:ext uri="{FF2B5EF4-FFF2-40B4-BE49-F238E27FC236}">
-                <a16:creationId xmlns:a16="http://schemas.microsoft.com/office/drawing/2014/main" id="{30AD2B9B-64B2-4F8A-8BA3-3D5BA859AC6B}"/>
+                <a16:creationId xmlns:a16="http://schemas.microsoft.com/office/drawing/2014/main" xmlns="" id="{30AD2B9B-64B2-4F8A-8BA3-3D5BA859AC6B}"/>
               </a:ext>
             </a:extLst>
           </p:cNvPr>
@@ -8283,7 +8283,7 @@
           <p:cNvPr id="18" name="TextBox 17">
             <a:extLst>
               <a:ext uri="{FF2B5EF4-FFF2-40B4-BE49-F238E27FC236}">
-                <a16:creationId xmlns:a16="http://schemas.microsoft.com/office/drawing/2014/main" id="{C41D69F8-1C98-4A01-95D1-ABD1D10BDD7D}"/>
+                <a16:creationId xmlns:a16="http://schemas.microsoft.com/office/drawing/2014/main" xmlns="" id="{C41D69F8-1C98-4A01-95D1-ABD1D10BDD7D}"/>
               </a:ext>
             </a:extLst>
           </p:cNvPr>
@@ -8326,7 +8326,7 @@
           <p:cNvPr id="19" name="TextBox 18">
             <a:extLst>
               <a:ext uri="{FF2B5EF4-FFF2-40B4-BE49-F238E27FC236}">
-                <a16:creationId xmlns:a16="http://schemas.microsoft.com/office/drawing/2014/main" id="{A92D38FB-61D2-4DD1-B8DC-4C9CB4AF5010}"/>
+                <a16:creationId xmlns:a16="http://schemas.microsoft.com/office/drawing/2014/main" xmlns="" id="{A92D38FB-61D2-4DD1-B8DC-4C9CB4AF5010}"/>
               </a:ext>
             </a:extLst>
           </p:cNvPr>
@@ -8368,7 +8368,7 @@
           <p:cNvPr id="20" name="TextBox 19">
             <a:extLst>
               <a:ext uri="{FF2B5EF4-FFF2-40B4-BE49-F238E27FC236}">
-                <a16:creationId xmlns:a16="http://schemas.microsoft.com/office/drawing/2014/main" id="{751537D2-5CA2-46E9-98DA-5D0BC05C4061}"/>
+                <a16:creationId xmlns:a16="http://schemas.microsoft.com/office/drawing/2014/main" xmlns="" id="{751537D2-5CA2-46E9-98DA-5D0BC05C4061}"/>
               </a:ext>
             </a:extLst>
           </p:cNvPr>
@@ -8414,7 +8414,7 @@
           <p:cNvPr id="22" name="Rectangle 21">
             <a:extLst>
               <a:ext uri="{FF2B5EF4-FFF2-40B4-BE49-F238E27FC236}">
-                <a16:creationId xmlns:a16="http://schemas.microsoft.com/office/drawing/2014/main" id="{ADD36DBD-8DDC-434F-9125-A76A4D4E0292}"/>
+                <a16:creationId xmlns:a16="http://schemas.microsoft.com/office/drawing/2014/main" xmlns="" id="{ADD36DBD-8DDC-434F-9125-A76A4D4E0292}"/>
               </a:ext>
             </a:extLst>
           </p:cNvPr>
@@ -8466,7 +8466,7 @@
           <p:cNvPr id="23" name="TextBox 22">
             <a:extLst>
               <a:ext uri="{FF2B5EF4-FFF2-40B4-BE49-F238E27FC236}">
-                <a16:creationId xmlns:a16="http://schemas.microsoft.com/office/drawing/2014/main" id="{ED06F2CA-B022-4B57-93BA-3A4A5FD519CB}"/>
+                <a16:creationId xmlns:a16="http://schemas.microsoft.com/office/drawing/2014/main" xmlns="" id="{ED06F2CA-B022-4B57-93BA-3A4A5FD519CB}"/>
               </a:ext>
             </a:extLst>
           </p:cNvPr>
@@ -8531,7 +8531,7 @@
           <p:cNvPr id="24" name="Straight Arrow Connector 23">
             <a:extLst>
               <a:ext uri="{FF2B5EF4-FFF2-40B4-BE49-F238E27FC236}">
-                <a16:creationId xmlns:a16="http://schemas.microsoft.com/office/drawing/2014/main" id="{63C8345C-A17E-44D4-B240-B3C2E331255D}"/>
+                <a16:creationId xmlns:a16="http://schemas.microsoft.com/office/drawing/2014/main" xmlns="" id="{63C8345C-A17E-44D4-B240-B3C2E331255D}"/>
               </a:ext>
             </a:extLst>
           </p:cNvPr>
@@ -8577,7 +8577,7 @@
           <p:cNvPr id="32" name="TextBox 31">
             <a:extLst>
               <a:ext uri="{FF2B5EF4-FFF2-40B4-BE49-F238E27FC236}">
-                <a16:creationId xmlns:a16="http://schemas.microsoft.com/office/drawing/2014/main" id="{1ADC0E6E-5955-4431-A055-13C603AF1C44}"/>
+                <a16:creationId xmlns:a16="http://schemas.microsoft.com/office/drawing/2014/main" xmlns="" id="{1ADC0E6E-5955-4431-A055-13C603AF1C44}"/>
               </a:ext>
             </a:extLst>
           </p:cNvPr>
@@ -8620,7 +8620,7 @@
           <p:cNvPr id="33" name="Flowchart: Delay 32">
             <a:extLst>
               <a:ext uri="{FF2B5EF4-FFF2-40B4-BE49-F238E27FC236}">
-                <a16:creationId xmlns:a16="http://schemas.microsoft.com/office/drawing/2014/main" id="{4FFA08B9-25E3-46A3-8F38-170EF9FDDAA3}"/>
+                <a16:creationId xmlns:a16="http://schemas.microsoft.com/office/drawing/2014/main" xmlns="" id="{4FFA08B9-25E3-46A3-8F38-170EF9FDDAA3}"/>
               </a:ext>
             </a:extLst>
           </p:cNvPr>
@@ -8672,7 +8672,7 @@
           <p:cNvPr id="38" name="Straight Arrow Connector 37">
             <a:extLst>
               <a:ext uri="{FF2B5EF4-FFF2-40B4-BE49-F238E27FC236}">
-                <a16:creationId xmlns:a16="http://schemas.microsoft.com/office/drawing/2014/main" id="{6499CFC4-90F7-4835-AE26-D8AB856D5641}"/>
+                <a16:creationId xmlns:a16="http://schemas.microsoft.com/office/drawing/2014/main" xmlns="" id="{6499CFC4-90F7-4835-AE26-D8AB856D5641}"/>
               </a:ext>
             </a:extLst>
           </p:cNvPr>
@@ -8719,7 +8719,7 @@
           <p:cNvPr id="43" name="TextBox 42">
             <a:extLst>
               <a:ext uri="{FF2B5EF4-FFF2-40B4-BE49-F238E27FC236}">
-                <a16:creationId xmlns:a16="http://schemas.microsoft.com/office/drawing/2014/main" id="{358B10D6-A0B4-4434-AACB-C474B6F3546A}"/>
+                <a16:creationId xmlns:a16="http://schemas.microsoft.com/office/drawing/2014/main" xmlns="" id="{358B10D6-A0B4-4434-AACB-C474B6F3546A}"/>
               </a:ext>
             </a:extLst>
           </p:cNvPr>
@@ -8755,7 +8755,7 @@
           <p:cNvPr id="44" name="TextBox 43">
             <a:extLst>
               <a:ext uri="{FF2B5EF4-FFF2-40B4-BE49-F238E27FC236}">
-                <a16:creationId xmlns:a16="http://schemas.microsoft.com/office/drawing/2014/main" id="{BAB3948D-F827-44D1-B40E-A737164AC616}"/>
+                <a16:creationId xmlns:a16="http://schemas.microsoft.com/office/drawing/2014/main" xmlns="" id="{BAB3948D-F827-44D1-B40E-A737164AC616}"/>
               </a:ext>
             </a:extLst>
           </p:cNvPr>
@@ -8838,7 +8838,7 @@
           <p:cNvPr id="46" name="Flowchart: Alternate Process 45">
             <a:extLst>
               <a:ext uri="{FF2B5EF4-FFF2-40B4-BE49-F238E27FC236}">
-                <a16:creationId xmlns:a16="http://schemas.microsoft.com/office/drawing/2014/main" id="{788ACF15-712D-427B-85E3-BFDE6D2778B7}"/>
+                <a16:creationId xmlns:a16="http://schemas.microsoft.com/office/drawing/2014/main" xmlns="" id="{788ACF15-712D-427B-85E3-BFDE6D2778B7}"/>
               </a:ext>
             </a:extLst>
           </p:cNvPr>
@@ -8890,7 +8890,7 @@
           <p:cNvPr id="47" name="TextBox 46">
             <a:extLst>
               <a:ext uri="{FF2B5EF4-FFF2-40B4-BE49-F238E27FC236}">
-                <a16:creationId xmlns:a16="http://schemas.microsoft.com/office/drawing/2014/main" id="{74812398-B0DB-4253-BDA5-F09C7A7449E7}"/>
+                <a16:creationId xmlns:a16="http://schemas.microsoft.com/office/drawing/2014/main" xmlns="" id="{74812398-B0DB-4253-BDA5-F09C7A7449E7}"/>
               </a:ext>
             </a:extLst>
           </p:cNvPr>
@@ -8973,7 +8973,7 @@
           <p:cNvPr id="52" name="Arrow: Chevron 51">
             <a:extLst>
               <a:ext uri="{FF2B5EF4-FFF2-40B4-BE49-F238E27FC236}">
-                <a16:creationId xmlns:a16="http://schemas.microsoft.com/office/drawing/2014/main" id="{842C5092-8294-4030-A526-A8C839E4F69D}"/>
+                <a16:creationId xmlns:a16="http://schemas.microsoft.com/office/drawing/2014/main" xmlns="" id="{842C5092-8294-4030-A526-A8C839E4F69D}"/>
               </a:ext>
             </a:extLst>
           </p:cNvPr>
@@ -9027,7 +9027,7 @@
           <p:cNvPr id="53" name="TextBox 52">
             <a:extLst>
               <a:ext uri="{FF2B5EF4-FFF2-40B4-BE49-F238E27FC236}">
-                <a16:creationId xmlns:a16="http://schemas.microsoft.com/office/drawing/2014/main" id="{5D685C8E-8026-4C55-BE1C-CC18B646995B}"/>
+                <a16:creationId xmlns:a16="http://schemas.microsoft.com/office/drawing/2014/main" xmlns="" id="{5D685C8E-8026-4C55-BE1C-CC18B646995B}"/>
               </a:ext>
             </a:extLst>
           </p:cNvPr>
@@ -9036,8 +9036,8 @@
         </p:nvSpPr>
         <p:spPr>
           <a:xfrm>
-            <a:off x="8657438" y="5894835"/>
-            <a:ext cx="1335622" cy="461665"/>
+            <a:off x="8589314" y="5692679"/>
+            <a:ext cx="1471878" cy="830997"/>
           </a:xfrm>
           <a:prstGeom prst="rect">
             <a:avLst/>
@@ -9052,7 +9052,7 @@
           <a:p>
             <a:pPr algn="ctr"/>
             <a:r>
-              <a:rPr lang="en-GB" sz="2400" b="1" dirty="0">
+              <a:rPr lang="en-GB" sz="2400" b="1" dirty="0" smtClean="0">
                 <a:solidFill>
                   <a:schemeClr val="bg2"/>
                 </a:solidFill>
@@ -9064,8 +9064,38 @@
                   </a:glow>
                 </a:effectLst>
               </a:rPr>
-              <a:t>Classifier</a:t>
+              <a:t>Google </a:t>
             </a:r>
+          </a:p>
+          <a:p>
+            <a:pPr algn="ctr"/>
+            <a:r>
+              <a:rPr lang="en-GB" sz="2400" b="1" dirty="0" smtClean="0">
+                <a:solidFill>
+                  <a:schemeClr val="bg2"/>
+                </a:solidFill>
+                <a:effectLst>
+                  <a:glow rad="101600">
+                    <a:schemeClr val="tx1">
+                      <a:alpha val="60000"/>
+                    </a:schemeClr>
+                  </a:glow>
+                </a:effectLst>
+              </a:rPr>
+              <a:t>Vision API</a:t>
+            </a:r>
+            <a:endParaRPr lang="en-GB" sz="2400" b="1" dirty="0">
+              <a:solidFill>
+                <a:schemeClr val="bg2"/>
+              </a:solidFill>
+              <a:effectLst>
+                <a:glow rad="101600">
+                  <a:schemeClr val="tx1">
+                    <a:alpha val="60000"/>
+                  </a:schemeClr>
+                </a:glow>
+              </a:effectLst>
+            </a:endParaRPr>
           </a:p>
         </p:txBody>
       </p:sp>
@@ -9074,7 +9104,7 @@
           <p:cNvPr id="55" name="Straight Arrow Connector 54">
             <a:extLst>
               <a:ext uri="{FF2B5EF4-FFF2-40B4-BE49-F238E27FC236}">
-                <a16:creationId xmlns:a16="http://schemas.microsoft.com/office/drawing/2014/main" id="{D93FAD61-E741-499C-820D-AF2A26A6E4DB}"/>
+                <a16:creationId xmlns:a16="http://schemas.microsoft.com/office/drawing/2014/main" xmlns="" id="{D93FAD61-E741-499C-820D-AF2A26A6E4DB}"/>
               </a:ext>
             </a:extLst>
           </p:cNvPr>
@@ -9120,7 +9150,7 @@
           <p:cNvPr id="56" name="TextBox 55">
             <a:extLst>
               <a:ext uri="{FF2B5EF4-FFF2-40B4-BE49-F238E27FC236}">
-                <a16:creationId xmlns:a16="http://schemas.microsoft.com/office/drawing/2014/main" id="{B32A810F-BF6B-4000-9AFD-8B8D42D80E47}"/>
+                <a16:creationId xmlns:a16="http://schemas.microsoft.com/office/drawing/2014/main" xmlns="" id="{B32A810F-BF6B-4000-9AFD-8B8D42D80E47}"/>
               </a:ext>
             </a:extLst>
           </p:cNvPr>
@@ -9156,7 +9186,7 @@
           <p:cNvPr id="57" name="TextBox 56">
             <a:extLst>
               <a:ext uri="{FF2B5EF4-FFF2-40B4-BE49-F238E27FC236}">
-                <a16:creationId xmlns:a16="http://schemas.microsoft.com/office/drawing/2014/main" id="{F0193D04-3208-4F06-BBA2-FE37BC71626F}"/>
+                <a16:creationId xmlns:a16="http://schemas.microsoft.com/office/drawing/2014/main" xmlns="" id="{F0193D04-3208-4F06-BBA2-FE37BC71626F}"/>
               </a:ext>
             </a:extLst>
           </p:cNvPr>
@@ -9192,7 +9222,7 @@
           <p:cNvPr id="80" name="Rectangle 79">
             <a:extLst>
               <a:ext uri="{FF2B5EF4-FFF2-40B4-BE49-F238E27FC236}">
-                <a16:creationId xmlns:a16="http://schemas.microsoft.com/office/drawing/2014/main" id="{CF30EFBD-3437-4FDF-9081-13DBAAD65887}"/>
+                <a16:creationId xmlns:a16="http://schemas.microsoft.com/office/drawing/2014/main" xmlns="" id="{CF30EFBD-3437-4FDF-9081-13DBAAD65887}"/>
               </a:ext>
             </a:extLst>
           </p:cNvPr>
@@ -9244,7 +9274,7 @@
           <p:cNvPr id="81" name="TextBox 80">
             <a:extLst>
               <a:ext uri="{FF2B5EF4-FFF2-40B4-BE49-F238E27FC236}">
-                <a16:creationId xmlns:a16="http://schemas.microsoft.com/office/drawing/2014/main" id="{4E211EC3-F05E-4D22-B4D7-E50D6AC867AA}"/>
+                <a16:creationId xmlns:a16="http://schemas.microsoft.com/office/drawing/2014/main" xmlns="" id="{4E211EC3-F05E-4D22-B4D7-E50D6AC867AA}"/>
               </a:ext>
             </a:extLst>
           </p:cNvPr>
@@ -9309,7 +9339,7 @@
           <p:cNvPr id="82" name="Straight Arrow Connector 81">
             <a:extLst>
               <a:ext uri="{FF2B5EF4-FFF2-40B4-BE49-F238E27FC236}">
-                <a16:creationId xmlns:a16="http://schemas.microsoft.com/office/drawing/2014/main" id="{EF6A4085-3032-4ED6-B8C5-9D0D4489DE48}"/>
+                <a16:creationId xmlns:a16="http://schemas.microsoft.com/office/drawing/2014/main" xmlns="" id="{EF6A4085-3032-4ED6-B8C5-9D0D4489DE48}"/>
               </a:ext>
             </a:extLst>
           </p:cNvPr>
@@ -9355,7 +9385,7 @@
           <p:cNvPr id="84" name="Straight Arrow Connector 83">
             <a:extLst>
               <a:ext uri="{FF2B5EF4-FFF2-40B4-BE49-F238E27FC236}">
-                <a16:creationId xmlns:a16="http://schemas.microsoft.com/office/drawing/2014/main" id="{45E32707-AC4D-4A84-9B59-2ADAD8FEF78B}"/>
+                <a16:creationId xmlns:a16="http://schemas.microsoft.com/office/drawing/2014/main" xmlns="" id="{45E32707-AC4D-4A84-9B59-2ADAD8FEF78B}"/>
               </a:ext>
             </a:extLst>
           </p:cNvPr>

</xml_diff>

<commit_message>
Update Visual Plan + UML
</commit_message>
<xml_diff>
--- a/Visual Plan.pptx
+++ b/Visual Plan.pptx
@@ -268,7 +268,7 @@
           <a:p>
             <a:fld id="{5F9021A5-5D2C-4FF7-8FBA-B61BDE30AE1B}" type="datetimeFigureOut">
               <a:rPr lang="en-GB" smtClean="0"/>
-              <a:t>21/01/2019</a:t>
+              <a:t>22/01/2019</a:t>
             </a:fld>
             <a:endParaRPr lang="en-GB"/>
           </a:p>
@@ -468,7 +468,7 @@
           <a:p>
             <a:fld id="{5F9021A5-5D2C-4FF7-8FBA-B61BDE30AE1B}" type="datetimeFigureOut">
               <a:rPr lang="en-GB" smtClean="0"/>
-              <a:t>21/01/2019</a:t>
+              <a:t>22/01/2019</a:t>
             </a:fld>
             <a:endParaRPr lang="en-GB"/>
           </a:p>
@@ -678,7 +678,7 @@
           <a:p>
             <a:fld id="{5F9021A5-5D2C-4FF7-8FBA-B61BDE30AE1B}" type="datetimeFigureOut">
               <a:rPr lang="en-GB" smtClean="0"/>
-              <a:t>21/01/2019</a:t>
+              <a:t>22/01/2019</a:t>
             </a:fld>
             <a:endParaRPr lang="en-GB"/>
           </a:p>
@@ -878,7 +878,7 @@
           <a:p>
             <a:fld id="{5F9021A5-5D2C-4FF7-8FBA-B61BDE30AE1B}" type="datetimeFigureOut">
               <a:rPr lang="en-GB" smtClean="0"/>
-              <a:t>21/01/2019</a:t>
+              <a:t>22/01/2019</a:t>
             </a:fld>
             <a:endParaRPr lang="en-GB"/>
           </a:p>
@@ -1154,7 +1154,7 @@
           <a:p>
             <a:fld id="{5F9021A5-5D2C-4FF7-8FBA-B61BDE30AE1B}" type="datetimeFigureOut">
               <a:rPr lang="en-GB" smtClean="0"/>
-              <a:t>21/01/2019</a:t>
+              <a:t>22/01/2019</a:t>
             </a:fld>
             <a:endParaRPr lang="en-GB"/>
           </a:p>
@@ -1422,7 +1422,7 @@
           <a:p>
             <a:fld id="{5F9021A5-5D2C-4FF7-8FBA-B61BDE30AE1B}" type="datetimeFigureOut">
               <a:rPr lang="en-GB" smtClean="0"/>
-              <a:t>21/01/2019</a:t>
+              <a:t>22/01/2019</a:t>
             </a:fld>
             <a:endParaRPr lang="en-GB"/>
           </a:p>
@@ -1837,7 +1837,7 @@
           <a:p>
             <a:fld id="{5F9021A5-5D2C-4FF7-8FBA-B61BDE30AE1B}" type="datetimeFigureOut">
               <a:rPr lang="en-GB" smtClean="0"/>
-              <a:t>21/01/2019</a:t>
+              <a:t>22/01/2019</a:t>
             </a:fld>
             <a:endParaRPr lang="en-GB"/>
           </a:p>
@@ -1979,7 +1979,7 @@
           <a:p>
             <a:fld id="{5F9021A5-5D2C-4FF7-8FBA-B61BDE30AE1B}" type="datetimeFigureOut">
               <a:rPr lang="en-GB" smtClean="0"/>
-              <a:t>21/01/2019</a:t>
+              <a:t>22/01/2019</a:t>
             </a:fld>
             <a:endParaRPr lang="en-GB"/>
           </a:p>
@@ -2092,7 +2092,7 @@
           <a:p>
             <a:fld id="{5F9021A5-5D2C-4FF7-8FBA-B61BDE30AE1B}" type="datetimeFigureOut">
               <a:rPr lang="en-GB" smtClean="0"/>
-              <a:t>21/01/2019</a:t>
+              <a:t>22/01/2019</a:t>
             </a:fld>
             <a:endParaRPr lang="en-GB"/>
           </a:p>
@@ -2405,7 +2405,7 @@
           <a:p>
             <a:fld id="{5F9021A5-5D2C-4FF7-8FBA-B61BDE30AE1B}" type="datetimeFigureOut">
               <a:rPr lang="en-GB" smtClean="0"/>
-              <a:t>21/01/2019</a:t>
+              <a:t>22/01/2019</a:t>
             </a:fld>
             <a:endParaRPr lang="en-GB"/>
           </a:p>
@@ -2694,7 +2694,7 @@
           <a:p>
             <a:fld id="{5F9021A5-5D2C-4FF7-8FBA-B61BDE30AE1B}" type="datetimeFigureOut">
               <a:rPr lang="en-GB" smtClean="0"/>
-              <a:t>21/01/2019</a:t>
+              <a:t>22/01/2019</a:t>
             </a:fld>
             <a:endParaRPr lang="en-GB"/>
           </a:p>
@@ -2937,7 +2937,7 @@
           <a:p>
             <a:fld id="{5F9021A5-5D2C-4FF7-8FBA-B61BDE30AE1B}" type="datetimeFigureOut">
               <a:rPr lang="en-GB" smtClean="0"/>
-              <a:t>21/01/2019</a:t>
+              <a:t>22/01/2019</a:t>
             </a:fld>
             <a:endParaRPr lang="en-GB"/>
           </a:p>
@@ -8083,6 +8083,104 @@
       </p:grpSpPr>
       <p:sp>
         <p:nvSpPr>
+          <p:cNvPr id="39" name="Rectangle 38"/>
+          <p:cNvSpPr/>
+          <p:nvPr/>
+        </p:nvSpPr>
+        <p:spPr>
+          <a:xfrm>
+            <a:off x="3918781" y="2594918"/>
+            <a:ext cx="2864162" cy="4263082"/>
+          </a:xfrm>
+          <a:prstGeom prst="rect">
+            <a:avLst/>
+          </a:prstGeom>
+          <a:solidFill>
+            <a:schemeClr val="accent6">
+              <a:lumMod val="40000"/>
+              <a:lumOff val="60000"/>
+            </a:schemeClr>
+          </a:solidFill>
+          <a:ln>
+            <a:noFill/>
+          </a:ln>
+        </p:spPr>
+        <p:style>
+          <a:lnRef idx="2">
+            <a:schemeClr val="accent1">
+              <a:shade val="50000"/>
+            </a:schemeClr>
+          </a:lnRef>
+          <a:fillRef idx="1">
+            <a:schemeClr val="accent1"/>
+          </a:fillRef>
+          <a:effectRef idx="0">
+            <a:schemeClr val="accent1"/>
+          </a:effectRef>
+          <a:fontRef idx="minor">
+            <a:schemeClr val="lt1"/>
+          </a:fontRef>
+        </p:style>
+        <p:txBody>
+          <a:bodyPr rtlCol="0" anchor="ctr"/>
+          <a:lstStyle/>
+          <a:p>
+            <a:pPr algn="ctr"/>
+            <a:endParaRPr lang="en-GB"/>
+          </a:p>
+        </p:txBody>
+      </p:sp>
+      <p:sp>
+        <p:nvSpPr>
+          <p:cNvPr id="13" name="Rectangle 12"/>
+          <p:cNvSpPr/>
+          <p:nvPr/>
+        </p:nvSpPr>
+        <p:spPr>
+          <a:xfrm>
+            <a:off x="-6863" y="-8238"/>
+            <a:ext cx="2857155" cy="6858000"/>
+          </a:xfrm>
+          <a:prstGeom prst="rect">
+            <a:avLst/>
+          </a:prstGeom>
+          <a:solidFill>
+            <a:schemeClr val="accent5">
+              <a:lumMod val="40000"/>
+              <a:lumOff val="60000"/>
+            </a:schemeClr>
+          </a:solidFill>
+          <a:ln>
+            <a:noFill/>
+          </a:ln>
+        </p:spPr>
+        <p:style>
+          <a:lnRef idx="2">
+            <a:schemeClr val="accent1">
+              <a:shade val="50000"/>
+            </a:schemeClr>
+          </a:lnRef>
+          <a:fillRef idx="1">
+            <a:schemeClr val="accent1"/>
+          </a:fillRef>
+          <a:effectRef idx="0">
+            <a:schemeClr val="accent1"/>
+          </a:effectRef>
+          <a:fontRef idx="minor">
+            <a:schemeClr val="lt1"/>
+          </a:fontRef>
+        </p:style>
+        <p:txBody>
+          <a:bodyPr rtlCol="0" anchor="ctr"/>
+          <a:lstStyle/>
+          <a:p>
+            <a:pPr algn="ctr"/>
+            <a:endParaRPr lang="en-GB"/>
+          </a:p>
+        </p:txBody>
+      </p:sp>
+      <p:sp>
+        <p:nvSpPr>
           <p:cNvPr id="45" name="Flowchart: Manual Input 44">
             <a:extLst>
               <a:ext uri="{FF2B5EF4-FFF2-40B4-BE49-F238E27FC236}">
@@ -8292,8 +8390,8 @@
         </p:nvSpPr>
         <p:spPr>
           <a:xfrm>
-            <a:off x="420850" y="2294424"/>
-            <a:ext cx="890821" cy="646331"/>
+            <a:off x="335517" y="2202091"/>
+            <a:ext cx="755604" cy="738664"/>
           </a:xfrm>
           <a:prstGeom prst="rect">
             <a:avLst/>
@@ -8306,18 +8404,23 @@
           </a:bodyPr>
           <a:lstStyle/>
           <a:p>
-            <a:pPr algn="r"/>
+            <a:pPr algn="ctr"/>
             <a:r>
-              <a:rPr lang="en-GB" dirty="0"/>
+              <a:rPr lang="en-GB" sz="1400" dirty="0"/>
               <a:t>Image </a:t>
             </a:r>
-          </a:p>
-          <a:p>
-            <a:pPr algn="r"/>
             <a:r>
-              <a:rPr lang="en-GB" dirty="0"/>
+              <a:rPr lang="en-GB" sz="1400" dirty="0" smtClean="0"/>
               <a:t>Stream</a:t>
             </a:r>
+          </a:p>
+          <a:p>
+            <a:pPr algn="ctr"/>
+            <a:r>
+              <a:rPr lang="en-GB" sz="1400" dirty="0" smtClean="0"/>
+              <a:t>\/</a:t>
+            </a:r>
+            <a:endParaRPr lang="en-GB" sz="1400" dirty="0"/>
           </a:p>
         </p:txBody>
       </p:sp>
@@ -8552,7 +8655,7 @@
             <a:solidFill>
               <a:schemeClr val="tx1"/>
             </a:solidFill>
-            <a:prstDash val="sysDot"/>
+            <a:prstDash val="dash"/>
             <a:headEnd type="triangle"/>
             <a:tailEnd type="triangle"/>
           </a:ln>
@@ -8586,8 +8689,8 @@
         </p:nvSpPr>
         <p:spPr>
           <a:xfrm>
-            <a:off x="3111843" y="3485139"/>
-            <a:ext cx="1367793" cy="646331"/>
+            <a:off x="2542215" y="3485139"/>
+            <a:ext cx="1914204" cy="307777"/>
           </a:xfrm>
           <a:prstGeom prst="rect">
             <a:avLst/>
@@ -8602,16 +8705,10 @@
           <a:p>
             <a:pPr algn="r"/>
             <a:r>
-              <a:rPr lang="en-GB" dirty="0"/>
-              <a:t>Background </a:t>
+              <a:rPr lang="en-GB" sz="1400" dirty="0" smtClean="0"/>
+              <a:t>BG + Frame &gt;</a:t>
             </a:r>
-          </a:p>
-          <a:p>
-            <a:pPr algn="r"/>
-            <a:r>
-              <a:rPr lang="en-GB" dirty="0"/>
-              <a:t>+ Frame</a:t>
-            </a:r>
+            <a:endParaRPr lang="en-GB" sz="1400" dirty="0"/>
           </a:p>
         </p:txBody>
       </p:sp>
@@ -8728,8 +8825,8 @@
         </p:nvSpPr>
         <p:spPr>
           <a:xfrm>
-            <a:off x="1" y="3803290"/>
-            <a:ext cx="1314398" cy="646331"/>
+            <a:off x="149774" y="3803290"/>
+            <a:ext cx="1127092" cy="523220"/>
           </a:xfrm>
           <a:prstGeom prst="rect">
             <a:avLst/>
@@ -8742,11 +8839,19 @@
           </a:bodyPr>
           <a:lstStyle/>
           <a:p>
-            <a:pPr algn="r"/>
+            <a:pPr algn="ctr"/>
             <a:r>
-              <a:rPr lang="en-GB" dirty="0"/>
-              <a:t>Background Image</a:t>
+              <a:rPr lang="en-GB" sz="1400" dirty="0" smtClean="0"/>
+              <a:t>/\</a:t>
             </a:r>
+          </a:p>
+          <a:p>
+            <a:pPr algn="ctr"/>
+            <a:r>
+              <a:rPr lang="en-GB" sz="1400" dirty="0" smtClean="0"/>
+              <a:t>Background</a:t>
+            </a:r>
+            <a:endParaRPr lang="en-GB" sz="1400" dirty="0"/>
           </a:p>
         </p:txBody>
       </p:sp>
@@ -9125,7 +9230,7 @@
             <a:solidFill>
               <a:schemeClr val="tx1"/>
             </a:solidFill>
-            <a:prstDash val="sysDot"/>
+            <a:prstDash val="solid"/>
             <a:headEnd type="triangle"/>
             <a:tailEnd type="triangle"/>
           </a:ln>
@@ -9160,7 +9265,7 @@
         <p:spPr>
           <a:xfrm>
             <a:off x="6236670" y="5599997"/>
-            <a:ext cx="787712" cy="369332"/>
+            <a:ext cx="1083912" cy="307777"/>
           </a:xfrm>
           <a:prstGeom prst="rect">
             <a:avLst/>
@@ -9175,9 +9280,10 @@
           <a:p>
             <a:pPr algn="ctr"/>
             <a:r>
-              <a:rPr lang="en-GB" dirty="0"/>
-              <a:t>Labels</a:t>
+              <a:rPr lang="en-GB" sz="1400" dirty="0" smtClean="0"/>
+              <a:t>&lt; Labels</a:t>
             </a:r>
+            <a:endParaRPr lang="en-GB" sz="1400" dirty="0"/>
           </a:p>
         </p:txBody>
       </p:sp>
@@ -9195,8 +9301,8 @@
         </p:nvSpPr>
         <p:spPr>
           <a:xfrm>
-            <a:off x="5382460" y="3926637"/>
-            <a:ext cx="894294" cy="646331"/>
+            <a:off x="4422509" y="3926637"/>
+            <a:ext cx="802510" cy="738664"/>
           </a:xfrm>
           <a:prstGeom prst="rect">
             <a:avLst/>
@@ -9211,9 +9317,17 @@
           <a:p>
             <a:pPr algn="ctr"/>
             <a:r>
-              <a:rPr lang="en-GB" dirty="0"/>
-              <a:t>Object Labels</a:t>
+              <a:rPr lang="en-GB" sz="1400" dirty="0" smtClean="0"/>
+              <a:t>/\</a:t>
             </a:r>
+          </a:p>
+          <a:p>
+            <a:pPr algn="ctr"/>
+            <a:r>
+              <a:rPr lang="en-GB" sz="1400" dirty="0" smtClean="0"/>
+              <a:t>Labelled Objects</a:t>
+            </a:r>
+            <a:endParaRPr lang="en-GB" sz="1400" dirty="0"/>
           </a:p>
         </p:txBody>
       </p:sp>
@@ -9360,7 +9474,7 @@
             <a:solidFill>
               <a:schemeClr val="tx1"/>
             </a:solidFill>
-            <a:prstDash val="sysDot"/>
+            <a:prstDash val="solid"/>
             <a:headEnd type="triangle"/>
             <a:tailEnd type="triangle"/>
           </a:ln>
@@ -9382,10 +9496,405 @@
       </p:cxnSp>
       <p:cxnSp>
         <p:nvCxnSpPr>
-          <p:cNvPr id="84" name="Straight Arrow Connector 83">
-            <a:extLst>
-              <a:ext uri="{FF2B5EF4-FFF2-40B4-BE49-F238E27FC236}">
-                <a16:creationId xmlns:a16="http://schemas.microsoft.com/office/drawing/2014/main" xmlns="" id="{45E32707-AC4D-4A84-9B59-2ADAD8FEF78B}"/>
+          <p:cNvPr id="3" name="Straight Connector 2"/>
+          <p:cNvCxnSpPr/>
+          <p:nvPr/>
+        </p:nvCxnSpPr>
+        <p:spPr>
+          <a:xfrm>
+            <a:off x="7447005" y="6050578"/>
+            <a:ext cx="1064114" cy="0"/>
+          </a:xfrm>
+          <a:prstGeom prst="line">
+            <a:avLst/>
+          </a:prstGeom>
+          <a:ln w="76200">
+            <a:solidFill>
+              <a:schemeClr val="tx1"/>
+            </a:solidFill>
+            <a:headEnd type="oval"/>
+          </a:ln>
+        </p:spPr>
+        <p:style>
+          <a:lnRef idx="1">
+            <a:schemeClr val="accent1"/>
+          </a:lnRef>
+          <a:fillRef idx="0">
+            <a:schemeClr val="accent1"/>
+          </a:fillRef>
+          <a:effectRef idx="0">
+            <a:schemeClr val="accent1"/>
+          </a:effectRef>
+          <a:fontRef idx="minor">
+            <a:schemeClr val="tx1"/>
+          </a:fontRef>
+        </p:style>
+      </p:cxnSp>
+      <p:cxnSp>
+        <p:nvCxnSpPr>
+          <p:cNvPr id="34" name="Straight Connector 33"/>
+          <p:cNvCxnSpPr/>
+          <p:nvPr/>
+        </p:nvCxnSpPr>
+        <p:spPr>
+          <a:xfrm flipH="1">
+            <a:off x="6184970" y="6050578"/>
+            <a:ext cx="1080803" cy="0"/>
+          </a:xfrm>
+          <a:prstGeom prst="line">
+            <a:avLst/>
+          </a:prstGeom>
+          <a:ln w="76200">
+            <a:solidFill>
+              <a:schemeClr val="tx1"/>
+            </a:solidFill>
+            <a:headEnd type="none"/>
+          </a:ln>
+        </p:spPr>
+        <p:style>
+          <a:lnRef idx="1">
+            <a:schemeClr val="accent1"/>
+          </a:lnRef>
+          <a:fillRef idx="0">
+            <a:schemeClr val="accent1"/>
+          </a:fillRef>
+          <a:effectRef idx="0">
+            <a:schemeClr val="accent1"/>
+          </a:effectRef>
+          <a:fontRef idx="minor">
+            <a:schemeClr val="tx1"/>
+          </a:fontRef>
+        </p:style>
+      </p:cxnSp>
+      <p:sp>
+        <p:nvSpPr>
+          <p:cNvPr id="12" name="Block Arc 11"/>
+          <p:cNvSpPr/>
+          <p:nvPr/>
+        </p:nvSpPr>
+        <p:spPr>
+          <a:xfrm rot="16200000">
+            <a:off x="7257481" y="5857875"/>
+            <a:ext cx="382118" cy="382118"/>
+          </a:xfrm>
+          <a:prstGeom prst="blockArc">
+            <a:avLst>
+              <a:gd name="adj1" fmla="val 10800000"/>
+              <a:gd name="adj2" fmla="val 9152"/>
+              <a:gd name="adj3" fmla="val 10583"/>
+            </a:avLst>
+          </a:prstGeom>
+          <a:solidFill>
+            <a:schemeClr val="tx1"/>
+          </a:solidFill>
+          <a:ln>
+            <a:noFill/>
+          </a:ln>
+        </p:spPr>
+        <p:style>
+          <a:lnRef idx="2">
+            <a:schemeClr val="accent1">
+              <a:shade val="50000"/>
+            </a:schemeClr>
+          </a:lnRef>
+          <a:fillRef idx="1">
+            <a:schemeClr val="accent1"/>
+          </a:fillRef>
+          <a:effectRef idx="0">
+            <a:schemeClr val="accent1"/>
+          </a:effectRef>
+          <a:fontRef idx="minor">
+            <a:schemeClr val="lt1"/>
+          </a:fontRef>
+        </p:style>
+        <p:txBody>
+          <a:bodyPr rtlCol="0" anchor="ctr"/>
+          <a:lstStyle/>
+          <a:p>
+            <a:pPr algn="ctr"/>
+            <a:endParaRPr lang="en-GB">
+              <a:solidFill>
+                <a:schemeClr val="tx1"/>
+              </a:solidFill>
+            </a:endParaRPr>
+          </a:p>
+        </p:txBody>
+      </p:sp>
+      <p:sp>
+        <p:nvSpPr>
+          <p:cNvPr id="41" name="TextBox 40">
+            <a:extLst>
+              <a:ext uri="{FF2B5EF4-FFF2-40B4-BE49-F238E27FC236}">
+                <a16:creationId xmlns:a16="http://schemas.microsoft.com/office/drawing/2014/main" xmlns="" id="{358B10D6-A0B4-4434-AACB-C474B6F3546A}"/>
+              </a:ext>
+            </a:extLst>
+          </p:cNvPr>
+          <p:cNvSpPr txBox="1"/>
+          <p:nvPr/>
+        </p:nvSpPr>
+        <p:spPr>
+          <a:xfrm>
+            <a:off x="352920" y="4902891"/>
+            <a:ext cx="720799" cy="523220"/>
+          </a:xfrm>
+          <a:prstGeom prst="rect">
+            <a:avLst/>
+          </a:prstGeom>
+          <a:noFill/>
+        </p:spPr>
+        <p:txBody>
+          <a:bodyPr wrap="square" rtlCol="0">
+            <a:spAutoFit/>
+          </a:bodyPr>
+          <a:lstStyle/>
+          <a:p>
+            <a:pPr algn="ctr"/>
+            <a:r>
+              <a:rPr lang="en-GB" sz="1400" dirty="0" smtClean="0"/>
+              <a:t>Frames</a:t>
+            </a:r>
+          </a:p>
+          <a:p>
+            <a:pPr algn="ctr"/>
+            <a:r>
+              <a:rPr lang="en-GB" sz="1400" dirty="0" smtClean="0"/>
+              <a:t>\/</a:t>
+            </a:r>
+            <a:endParaRPr lang="en-GB" sz="1400" dirty="0"/>
+          </a:p>
+        </p:txBody>
+      </p:sp>
+      <p:sp>
+        <p:nvSpPr>
+          <p:cNvPr id="42" name="TextBox 41">
+            <a:extLst>
+              <a:ext uri="{FF2B5EF4-FFF2-40B4-BE49-F238E27FC236}">
+                <a16:creationId xmlns:a16="http://schemas.microsoft.com/office/drawing/2014/main" xmlns="" id="{F0193D04-3208-4F06-BBA2-FE37BC71626F}"/>
+              </a:ext>
+            </a:extLst>
+          </p:cNvPr>
+          <p:cNvSpPr txBox="1"/>
+          <p:nvPr/>
+        </p:nvSpPr>
+        <p:spPr>
+          <a:xfrm>
+            <a:off x="4422509" y="4726459"/>
+            <a:ext cx="802510" cy="738664"/>
+          </a:xfrm>
+          <a:prstGeom prst="rect">
+            <a:avLst/>
+          </a:prstGeom>
+          <a:noFill/>
+        </p:spPr>
+        <p:txBody>
+          <a:bodyPr wrap="square" rtlCol="0">
+            <a:spAutoFit/>
+          </a:bodyPr>
+          <a:lstStyle/>
+          <a:p>
+            <a:pPr algn="ctr"/>
+            <a:r>
+              <a:rPr lang="en-GB" sz="1400" dirty="0" smtClean="0"/>
+              <a:t>BG + Frame</a:t>
+            </a:r>
+          </a:p>
+          <a:p>
+            <a:pPr algn="ctr"/>
+            <a:r>
+              <a:rPr lang="en-GB" sz="1400" dirty="0" smtClean="0"/>
+              <a:t>\/</a:t>
+            </a:r>
+            <a:endParaRPr lang="en-GB" sz="1400" dirty="0"/>
+          </a:p>
+        </p:txBody>
+      </p:sp>
+      <p:sp>
+        <p:nvSpPr>
+          <p:cNvPr id="48" name="TextBox 47">
+            <a:extLst>
+              <a:ext uri="{FF2B5EF4-FFF2-40B4-BE49-F238E27FC236}">
+                <a16:creationId xmlns:a16="http://schemas.microsoft.com/office/drawing/2014/main" xmlns="" id="{B32A810F-BF6B-4000-9AFD-8B8D42D80E47}"/>
+              </a:ext>
+            </a:extLst>
+          </p:cNvPr>
+          <p:cNvSpPr txBox="1"/>
+          <p:nvPr/>
+        </p:nvSpPr>
+        <p:spPr>
+          <a:xfrm>
+            <a:off x="7369829" y="3539690"/>
+            <a:ext cx="1083912" cy="307777"/>
+          </a:xfrm>
+          <a:prstGeom prst="rect">
+            <a:avLst/>
+          </a:prstGeom>
+          <a:noFill/>
+        </p:spPr>
+        <p:txBody>
+          <a:bodyPr wrap="square" rtlCol="0">
+            <a:spAutoFit/>
+          </a:bodyPr>
+          <a:lstStyle/>
+          <a:p>
+            <a:pPr algn="ctr"/>
+            <a:r>
+              <a:rPr lang="en-GB" sz="1400" dirty="0" smtClean="0"/>
+              <a:t>Labels &gt;</a:t>
+            </a:r>
+            <a:endParaRPr lang="en-GB" sz="1400" dirty="0"/>
+          </a:p>
+        </p:txBody>
+      </p:sp>
+      <p:sp>
+        <p:nvSpPr>
+          <p:cNvPr id="51" name="Rectangle 50">
+            <a:extLst>
+              <a:ext uri="{FF2B5EF4-FFF2-40B4-BE49-F238E27FC236}">
+                <a16:creationId xmlns:a16="http://schemas.microsoft.com/office/drawing/2014/main" xmlns="" id="{ADD36DBD-8DDC-434F-9125-A76A4D4E0292}"/>
+              </a:ext>
+            </a:extLst>
+          </p:cNvPr>
+          <p:cNvSpPr/>
+          <p:nvPr/>
+        </p:nvSpPr>
+        <p:spPr>
+          <a:xfrm>
+            <a:off x="4404710" y="420055"/>
+            <a:ext cx="1831960" cy="976488"/>
+          </a:xfrm>
+          <a:prstGeom prst="rect">
+            <a:avLst/>
+          </a:prstGeom>
+          <a:solidFill>
+            <a:srgbClr val="000000"/>
+          </a:solidFill>
+          <a:ln>
+            <a:noFill/>
+          </a:ln>
+        </p:spPr>
+        <p:style>
+          <a:lnRef idx="2">
+            <a:schemeClr val="accent1">
+              <a:shade val="50000"/>
+            </a:schemeClr>
+          </a:lnRef>
+          <a:fillRef idx="1">
+            <a:schemeClr val="accent1"/>
+          </a:fillRef>
+          <a:effectRef idx="0">
+            <a:schemeClr val="accent1"/>
+          </a:effectRef>
+          <a:fontRef idx="minor">
+            <a:schemeClr val="lt1"/>
+          </a:fontRef>
+        </p:style>
+        <p:txBody>
+          <a:bodyPr rtlCol="0" anchor="ctr"/>
+          <a:lstStyle/>
+          <a:p>
+            <a:pPr algn="ctr"/>
+            <a:endParaRPr lang="en-GB"/>
+          </a:p>
+        </p:txBody>
+      </p:sp>
+      <p:sp>
+        <p:nvSpPr>
+          <p:cNvPr id="54" name="TextBox 53">
+            <a:extLst>
+              <a:ext uri="{FF2B5EF4-FFF2-40B4-BE49-F238E27FC236}">
+                <a16:creationId xmlns:a16="http://schemas.microsoft.com/office/drawing/2014/main" xmlns="" id="{ED06F2CA-B022-4B57-93BA-3A4A5FD519CB}"/>
+              </a:ext>
+            </a:extLst>
+          </p:cNvPr>
+          <p:cNvSpPr txBox="1"/>
+          <p:nvPr/>
+        </p:nvSpPr>
+        <p:spPr>
+          <a:xfrm>
+            <a:off x="3631972" y="492799"/>
+            <a:ext cx="3377463" cy="830997"/>
+          </a:xfrm>
+          <a:prstGeom prst="rect">
+            <a:avLst/>
+          </a:prstGeom>
+          <a:noFill/>
+        </p:spPr>
+        <p:txBody>
+          <a:bodyPr wrap="none" rtlCol="0">
+            <a:spAutoFit/>
+          </a:bodyPr>
+          <a:lstStyle/>
+          <a:p>
+            <a:pPr algn="ctr"/>
+            <a:r>
+              <a:rPr lang="en-GB" sz="2400" b="1" dirty="0" smtClean="0">
+                <a:solidFill>
+                  <a:schemeClr val="bg2"/>
+                </a:solidFill>
+                <a:effectLst>
+                  <a:glow rad="101600">
+                    <a:schemeClr val="tx1">
+                      <a:alpha val="60000"/>
+                    </a:schemeClr>
+                  </a:glow>
+                </a:effectLst>
+              </a:rPr>
+              <a:t>Robot Position </a:t>
+            </a:r>
+          </a:p>
+          <a:p>
+            <a:pPr algn="ctr"/>
+            <a:r>
+              <a:rPr lang="en-GB" sz="2400" b="1" smtClean="0">
+                <a:solidFill>
+                  <a:schemeClr val="bg2"/>
+                </a:solidFill>
+                <a:effectLst>
+                  <a:glow rad="101600">
+                    <a:schemeClr val="tx1">
+                      <a:alpha val="60000"/>
+                    </a:schemeClr>
+                  </a:glow>
+                </a:effectLst>
+              </a:rPr>
+              <a:t>Move </a:t>
+            </a:r>
+            <a:r>
+              <a:rPr lang="en-GB" sz="2400" b="1" dirty="0" smtClean="0">
+                <a:solidFill>
+                  <a:schemeClr val="bg2"/>
+                </a:solidFill>
+                <a:effectLst>
+                  <a:glow rad="101600">
+                    <a:schemeClr val="tx1">
+                      <a:alpha val="60000"/>
+                    </a:schemeClr>
+                  </a:glow>
+                </a:effectLst>
+              </a:rPr>
+              <a:t>Calculation System</a:t>
+            </a:r>
+            <a:endParaRPr lang="en-GB" sz="2400" b="1" dirty="0">
+              <a:solidFill>
+                <a:schemeClr val="bg2"/>
+              </a:solidFill>
+              <a:effectLst>
+                <a:glow rad="101600">
+                  <a:schemeClr val="tx1">
+                    <a:alpha val="60000"/>
+                  </a:schemeClr>
+                </a:glow>
+              </a:effectLst>
+            </a:endParaRPr>
+          </a:p>
+        </p:txBody>
+      </p:sp>
+      <p:cxnSp>
+        <p:nvCxnSpPr>
+          <p:cNvPr id="58" name="Straight Arrow Connector 57">
+            <a:extLst>
+              <a:ext uri="{FF2B5EF4-FFF2-40B4-BE49-F238E27FC236}">
+                <a16:creationId xmlns:a16="http://schemas.microsoft.com/office/drawing/2014/main" xmlns="" id="{D93FAD61-E741-499C-820D-AF2A26A6E4DB}"/>
               </a:ext>
             </a:extLst>
           </p:cNvPr>
@@ -9395,9 +9904,9 @@
           <p:nvPr/>
         </p:nvCxnSpPr>
         <p:spPr>
-          <a:xfrm>
-            <a:off x="6250651" y="6061695"/>
-            <a:ext cx="2260468" cy="0"/>
+          <a:xfrm flipV="1">
+            <a:off x="5350862" y="1373429"/>
+            <a:ext cx="0" cy="1546890"/>
           </a:xfrm>
           <a:prstGeom prst="straightConnector1">
             <a:avLst/>
@@ -9406,7 +9915,7 @@
             <a:solidFill>
               <a:schemeClr val="tx1"/>
             </a:solidFill>
-            <a:prstDash val="sysDot"/>
+            <a:prstDash val="solid"/>
             <a:headEnd type="triangle"/>
             <a:tailEnd type="triangle"/>
           </a:ln>
@@ -9426,6 +9935,94 @@
           </a:fontRef>
         </p:style>
       </p:cxnSp>
+      <p:sp>
+        <p:nvSpPr>
+          <p:cNvPr id="59" name="TextBox 58">
+            <a:extLst>
+              <a:ext uri="{FF2B5EF4-FFF2-40B4-BE49-F238E27FC236}">
+                <a16:creationId xmlns:a16="http://schemas.microsoft.com/office/drawing/2014/main" xmlns="" id="{F0193D04-3208-4F06-BBA2-FE37BC71626F}"/>
+              </a:ext>
+            </a:extLst>
+          </p:cNvPr>
+          <p:cNvSpPr txBox="1"/>
+          <p:nvPr/>
+        </p:nvSpPr>
+        <p:spPr>
+          <a:xfrm>
+            <a:off x="4422509" y="1405936"/>
+            <a:ext cx="802510" cy="738664"/>
+          </a:xfrm>
+          <a:prstGeom prst="rect">
+            <a:avLst/>
+          </a:prstGeom>
+          <a:noFill/>
+        </p:spPr>
+        <p:txBody>
+          <a:bodyPr wrap="square" rtlCol="0">
+            <a:spAutoFit/>
+          </a:bodyPr>
+          <a:lstStyle/>
+          <a:p>
+            <a:pPr algn="ctr"/>
+            <a:r>
+              <a:rPr lang="en-GB" sz="1400" dirty="0" smtClean="0"/>
+              <a:t>/\</a:t>
+            </a:r>
+          </a:p>
+          <a:p>
+            <a:pPr algn="ctr"/>
+            <a:r>
+              <a:rPr lang="en-GB" sz="1400" dirty="0" smtClean="0"/>
+              <a:t>Labelled Objects</a:t>
+            </a:r>
+            <a:endParaRPr lang="en-GB" sz="1400" dirty="0"/>
+          </a:p>
+        </p:txBody>
+      </p:sp>
+      <p:sp>
+        <p:nvSpPr>
+          <p:cNvPr id="60" name="TextBox 59">
+            <a:extLst>
+              <a:ext uri="{FF2B5EF4-FFF2-40B4-BE49-F238E27FC236}">
+                <a16:creationId xmlns:a16="http://schemas.microsoft.com/office/drawing/2014/main" xmlns="" id="{F0193D04-3208-4F06-BBA2-FE37BC71626F}"/>
+              </a:ext>
+            </a:extLst>
+          </p:cNvPr>
+          <p:cNvSpPr txBox="1"/>
+          <p:nvPr/>
+        </p:nvSpPr>
+        <p:spPr>
+          <a:xfrm>
+            <a:off x="4422509" y="2205758"/>
+            <a:ext cx="802510" cy="738664"/>
+          </a:xfrm>
+          <a:prstGeom prst="rect">
+            <a:avLst/>
+          </a:prstGeom>
+          <a:noFill/>
+        </p:spPr>
+        <p:txBody>
+          <a:bodyPr wrap="square" rtlCol="0">
+            <a:spAutoFit/>
+          </a:bodyPr>
+          <a:lstStyle/>
+          <a:p>
+            <a:pPr algn="ctr"/>
+            <a:r>
+              <a:rPr lang="en-GB" sz="1400" dirty="0" smtClean="0"/>
+              <a:t>BG + Frame</a:t>
+            </a:r>
+          </a:p>
+          <a:p>
+            <a:pPr algn="ctr"/>
+            <a:r>
+              <a:rPr lang="en-GB" sz="1400" dirty="0" smtClean="0"/>
+              <a:t>\/</a:t>
+            </a:r>
+            <a:endParaRPr lang="en-GB" sz="1400" dirty="0"/>
+          </a:p>
+        </p:txBody>
+      </p:sp>
     </p:spTree>
     <p:extLst>
       <p:ext uri="{BB962C8B-B14F-4D97-AF65-F5344CB8AC3E}">

</xml_diff>

<commit_message>
Visual Plan - ROS Setup
</commit_message>
<xml_diff>
--- a/Visual Plan.pptx
+++ b/Visual Plan.pptx
@@ -274,7 +274,7 @@
           <a:p>
             <a:fld id="{5F9021A5-5D2C-4FF7-8FBA-B61BDE30AE1B}" type="datetimeFigureOut">
               <a:rPr lang="en-GB" smtClean="0"/>
-              <a:t>02/02/2019</a:t>
+              <a:t>14/03/2019</a:t>
             </a:fld>
             <a:endParaRPr lang="en-GB" dirty="0"/>
           </a:p>
@@ -474,7 +474,7 @@
           <a:p>
             <a:fld id="{5F9021A5-5D2C-4FF7-8FBA-B61BDE30AE1B}" type="datetimeFigureOut">
               <a:rPr lang="en-GB" smtClean="0"/>
-              <a:t>02/02/2019</a:t>
+              <a:t>14/03/2019</a:t>
             </a:fld>
             <a:endParaRPr lang="en-GB" dirty="0"/>
           </a:p>
@@ -684,7 +684,7 @@
           <a:p>
             <a:fld id="{5F9021A5-5D2C-4FF7-8FBA-B61BDE30AE1B}" type="datetimeFigureOut">
               <a:rPr lang="en-GB" smtClean="0"/>
-              <a:t>02/02/2019</a:t>
+              <a:t>14/03/2019</a:t>
             </a:fld>
             <a:endParaRPr lang="en-GB" dirty="0"/>
           </a:p>
@@ -884,7 +884,7 @@
           <a:p>
             <a:fld id="{5F9021A5-5D2C-4FF7-8FBA-B61BDE30AE1B}" type="datetimeFigureOut">
               <a:rPr lang="en-GB" smtClean="0"/>
-              <a:t>02/02/2019</a:t>
+              <a:t>14/03/2019</a:t>
             </a:fld>
             <a:endParaRPr lang="en-GB" dirty="0"/>
           </a:p>
@@ -1160,7 +1160,7 @@
           <a:p>
             <a:fld id="{5F9021A5-5D2C-4FF7-8FBA-B61BDE30AE1B}" type="datetimeFigureOut">
               <a:rPr lang="en-GB" smtClean="0"/>
-              <a:t>02/02/2019</a:t>
+              <a:t>14/03/2019</a:t>
             </a:fld>
             <a:endParaRPr lang="en-GB" dirty="0"/>
           </a:p>
@@ -1428,7 +1428,7 @@
           <a:p>
             <a:fld id="{5F9021A5-5D2C-4FF7-8FBA-B61BDE30AE1B}" type="datetimeFigureOut">
               <a:rPr lang="en-GB" smtClean="0"/>
-              <a:t>02/02/2019</a:t>
+              <a:t>14/03/2019</a:t>
             </a:fld>
             <a:endParaRPr lang="en-GB" dirty="0"/>
           </a:p>
@@ -1843,7 +1843,7 @@
           <a:p>
             <a:fld id="{5F9021A5-5D2C-4FF7-8FBA-B61BDE30AE1B}" type="datetimeFigureOut">
               <a:rPr lang="en-GB" smtClean="0"/>
-              <a:t>02/02/2019</a:t>
+              <a:t>14/03/2019</a:t>
             </a:fld>
             <a:endParaRPr lang="en-GB" dirty="0"/>
           </a:p>
@@ -1985,7 +1985,7 @@
           <a:p>
             <a:fld id="{5F9021A5-5D2C-4FF7-8FBA-B61BDE30AE1B}" type="datetimeFigureOut">
               <a:rPr lang="en-GB" smtClean="0"/>
-              <a:t>02/02/2019</a:t>
+              <a:t>14/03/2019</a:t>
             </a:fld>
             <a:endParaRPr lang="en-GB" dirty="0"/>
           </a:p>
@@ -2098,7 +2098,7 @@
           <a:p>
             <a:fld id="{5F9021A5-5D2C-4FF7-8FBA-B61BDE30AE1B}" type="datetimeFigureOut">
               <a:rPr lang="en-GB" smtClean="0"/>
-              <a:t>02/02/2019</a:t>
+              <a:t>14/03/2019</a:t>
             </a:fld>
             <a:endParaRPr lang="en-GB" dirty="0"/>
           </a:p>
@@ -2411,7 +2411,7 @@
           <a:p>
             <a:fld id="{5F9021A5-5D2C-4FF7-8FBA-B61BDE30AE1B}" type="datetimeFigureOut">
               <a:rPr lang="en-GB" smtClean="0"/>
-              <a:t>02/02/2019</a:t>
+              <a:t>14/03/2019</a:t>
             </a:fld>
             <a:endParaRPr lang="en-GB" dirty="0"/>
           </a:p>
@@ -2700,7 +2700,7 @@
           <a:p>
             <a:fld id="{5F9021A5-5D2C-4FF7-8FBA-B61BDE30AE1B}" type="datetimeFigureOut">
               <a:rPr lang="en-GB" smtClean="0"/>
-              <a:t>02/02/2019</a:t>
+              <a:t>14/03/2019</a:t>
             </a:fld>
             <a:endParaRPr lang="en-GB" dirty="0"/>
           </a:p>
@@ -2943,7 +2943,7 @@
           <a:p>
             <a:fld id="{5F9021A5-5D2C-4FF7-8FBA-B61BDE30AE1B}" type="datetimeFigureOut">
               <a:rPr lang="en-GB" smtClean="0"/>
-              <a:t>02/02/2019</a:t>
+              <a:t>14/03/2019</a:t>
             </a:fld>
             <a:endParaRPr lang="en-GB" dirty="0"/>
           </a:p>

</xml_diff>